<commit_message>
move select distinct slides to intro deck
</commit_message>
<xml_diff>
--- a/slides-pptx/08b-sql-functions.pptx
+++ b/slides-pptx/08b-sql-functions.pptx
@@ -5,38 +5,37 @@
     <p:sldMasterId id="2147483648" r:id="rId1"/>
   </p:sldMasterIdLst>
   <p:notesMasterIdLst>
-    <p:notesMasterId r:id="rId17"/>
+    <p:notesMasterId r:id="rId16"/>
   </p:notesMasterIdLst>
   <p:sldIdLst>
     <p:sldId id="256" r:id="rId2"/>
     <p:sldId id="257" r:id="rId3"/>
-    <p:sldId id="260" r:id="rId4"/>
-    <p:sldId id="261" r:id="rId5"/>
-    <p:sldId id="262" r:id="rId6"/>
-    <p:sldId id="264" r:id="rId7"/>
-    <p:sldId id="265" r:id="rId8"/>
-    <p:sldId id="266" r:id="rId9"/>
-    <p:sldId id="267" r:id="rId10"/>
-    <p:sldId id="268" r:id="rId11"/>
-    <p:sldId id="269" r:id="rId12"/>
-    <p:sldId id="270" r:id="rId13"/>
-    <p:sldId id="271" r:id="rId14"/>
-    <p:sldId id="272" r:id="rId15"/>
-    <p:sldId id="273" r:id="rId16"/>
+    <p:sldId id="261" r:id="rId4"/>
+    <p:sldId id="262" r:id="rId5"/>
+    <p:sldId id="264" r:id="rId6"/>
+    <p:sldId id="265" r:id="rId7"/>
+    <p:sldId id="266" r:id="rId8"/>
+    <p:sldId id="267" r:id="rId9"/>
+    <p:sldId id="268" r:id="rId10"/>
+    <p:sldId id="269" r:id="rId11"/>
+    <p:sldId id="270" r:id="rId12"/>
+    <p:sldId id="271" r:id="rId13"/>
+    <p:sldId id="272" r:id="rId14"/>
+    <p:sldId id="273" r:id="rId15"/>
   </p:sldIdLst>
   <p:sldSz cx="12192000" cy="6858000"/>
   <p:notesSz cx="7102475" cy="9388475"/>
   <p:embeddedFontLst>
     <p:embeddedFont>
       <p:font typeface="Franklin Gothic" panose="020B0604020202020204" charset="0"/>
-      <p:bold r:id="rId18"/>
+      <p:bold r:id="rId17"/>
     </p:embeddedFont>
     <p:embeddedFont>
       <p:font typeface="Libre Franklin" pitchFamily="2" charset="0"/>
-      <p:regular r:id="rId19"/>
-      <p:bold r:id="rId20"/>
-      <p:italic r:id="rId21"/>
-      <p:boldItalic r:id="rId22"/>
+      <p:regular r:id="rId18"/>
+      <p:bold r:id="rId19"/>
+      <p:italic r:id="rId20"/>
+      <p:boldItalic r:id="rId21"/>
     </p:embeddedFont>
   </p:embeddedFontLst>
   <p:defaultTextStyle>
@@ -1645,7 +1644,7 @@
   <p:cSld>
     <p:spTree>
       <p:nvGrpSpPr>
-        <p:cNvPr id="1" name="Shape 216"/>
+        <p:cNvPr id="1" name="Shape 225"/>
         <p:cNvGrpSpPr/>
         <p:nvPr/>
       </p:nvGrpSpPr>
@@ -1659,7 +1658,7 @@
       </p:grpSpPr>
       <p:sp>
         <p:nvSpPr>
-          <p:cNvPr id="217" name="Google Shape;217;p16:notes"/>
+          <p:cNvPr id="226" name="Google Shape;226;p17:notes"/>
           <p:cNvSpPr txBox="1">
             <a:spLocks noGrp="1"/>
           </p:cNvSpPr>
@@ -1697,7 +1696,7 @@
       </p:sp>
       <p:sp>
         <p:nvSpPr>
-          <p:cNvPr id="218" name="Google Shape;218;p16:notes"/>
+          <p:cNvPr id="227" name="Google Shape;227;p17:notes"/>
           <p:cNvSpPr>
             <a:spLocks noGrp="1" noRot="1" noChangeAspect="1"/>
           </p:cNvSpPr>
@@ -1749,7 +1748,7 @@
   <p:cSld>
     <p:spTree>
       <p:nvGrpSpPr>
-        <p:cNvPr id="1" name="Shape 225"/>
+        <p:cNvPr id="1" name="Shape 239"/>
         <p:cNvGrpSpPr/>
         <p:nvPr/>
       </p:nvGrpSpPr>
@@ -1763,7 +1762,7 @@
       </p:grpSpPr>
       <p:sp>
         <p:nvSpPr>
-          <p:cNvPr id="226" name="Google Shape;226;p17:notes"/>
+          <p:cNvPr id="240" name="Google Shape;240;p18:notes"/>
           <p:cNvSpPr txBox="1">
             <a:spLocks noGrp="1"/>
           </p:cNvSpPr>
@@ -1801,7 +1800,7 @@
       </p:sp>
       <p:sp>
         <p:nvSpPr>
-          <p:cNvPr id="227" name="Google Shape;227;p17:notes"/>
+          <p:cNvPr id="241" name="Google Shape;241;p18:notes"/>
           <p:cNvSpPr>
             <a:spLocks noGrp="1" noRot="1" noChangeAspect="1"/>
           </p:cNvSpPr>
@@ -1853,7 +1852,7 @@
   <p:cSld>
     <p:spTree>
       <p:nvGrpSpPr>
-        <p:cNvPr id="1" name="Shape 239"/>
+        <p:cNvPr id="1" name="Shape 245"/>
         <p:cNvGrpSpPr/>
         <p:nvPr/>
       </p:nvGrpSpPr>
@@ -1867,7 +1866,7 @@
       </p:grpSpPr>
       <p:sp>
         <p:nvSpPr>
-          <p:cNvPr id="240" name="Google Shape;240;p18:notes"/>
+          <p:cNvPr id="246" name="Google Shape;246;p19:notes"/>
           <p:cNvSpPr txBox="1">
             <a:spLocks noGrp="1"/>
           </p:cNvSpPr>
@@ -1905,7 +1904,7 @@
       </p:sp>
       <p:sp>
         <p:nvSpPr>
-          <p:cNvPr id="241" name="Google Shape;241;p18:notes"/>
+          <p:cNvPr id="247" name="Google Shape;247;p19:notes"/>
           <p:cNvSpPr>
             <a:spLocks noGrp="1" noRot="1" noChangeAspect="1"/>
           </p:cNvSpPr>
@@ -1957,110 +1956,6 @@
   <p:cSld>
     <p:spTree>
       <p:nvGrpSpPr>
-        <p:cNvPr id="1" name="Shape 245"/>
-        <p:cNvGrpSpPr/>
-        <p:nvPr/>
-      </p:nvGrpSpPr>
-      <p:grpSpPr>
-        <a:xfrm>
-          <a:off x="0" y="0"/>
-          <a:ext cx="0" cy="0"/>
-          <a:chOff x="0" y="0"/>
-          <a:chExt cx="0" cy="0"/>
-        </a:xfrm>
-      </p:grpSpPr>
-      <p:sp>
-        <p:nvSpPr>
-          <p:cNvPr id="246" name="Google Shape;246;p19:notes"/>
-          <p:cNvSpPr txBox="1">
-            <a:spLocks noGrp="1"/>
-          </p:cNvSpPr>
-          <p:nvPr>
-            <p:ph type="body" idx="1"/>
-          </p:nvPr>
-        </p:nvSpPr>
-        <p:spPr>
-          <a:xfrm>
-            <a:off x="710248" y="4518204"/>
-            <a:ext cx="5681980" cy="3696712"/>
-          </a:xfrm>
-          <a:prstGeom prst="rect">
-            <a:avLst/>
-          </a:prstGeom>
-        </p:spPr>
-        <p:txBody>
-          <a:bodyPr spcFirstLastPara="1" wrap="square" lIns="94225" tIns="47100" rIns="94225" bIns="47100" anchor="t" anchorCtr="0">
-            <a:noAutofit/>
-          </a:bodyPr>
-          <a:lstStyle/>
-          <a:p>
-            <a:pPr marL="0" lvl="0" indent="0" algn="l" rtl="0">
-              <a:spcBef>
-                <a:spcPts val="0"/>
-              </a:spcBef>
-              <a:spcAft>
-                <a:spcPts val="0"/>
-              </a:spcAft>
-              <a:buNone/>
-            </a:pPr>
-            <a:endParaRPr/>
-          </a:p>
-        </p:txBody>
-      </p:sp>
-      <p:sp>
-        <p:nvSpPr>
-          <p:cNvPr id="247" name="Google Shape;247;p19:notes"/>
-          <p:cNvSpPr>
-            <a:spLocks noGrp="1" noRot="1" noChangeAspect="1"/>
-          </p:cNvSpPr>
-          <p:nvPr>
-            <p:ph type="sldImg" idx="2"/>
-          </p:nvPr>
-        </p:nvSpPr>
-        <p:spPr>
-          <a:xfrm>
-            <a:off x="735013" y="1173163"/>
-            <a:ext cx="5632450" cy="3168650"/>
-          </a:xfrm>
-          <a:custGeom>
-            <a:avLst/>
-            <a:gdLst/>
-            <a:ahLst/>
-            <a:cxnLst/>
-            <a:rect l="l" t="t" r="r" b="b"/>
-            <a:pathLst>
-              <a:path w="120000" h="120000" extrusionOk="0">
-                <a:moveTo>
-                  <a:pt x="0" y="0"/>
-                </a:moveTo>
-                <a:lnTo>
-                  <a:pt x="120000" y="0"/>
-                </a:lnTo>
-                <a:lnTo>
-                  <a:pt x="120000" y="120000"/>
-                </a:lnTo>
-                <a:lnTo>
-                  <a:pt x="0" y="120000"/>
-                </a:lnTo>
-                <a:close/>
-              </a:path>
-            </a:pathLst>
-          </a:custGeom>
-        </p:spPr>
-      </p:sp>
-    </p:spTree>
-  </p:cSld>
-  <p:clrMapOvr>
-    <a:masterClrMapping/>
-  </p:clrMapOvr>
-</p:notes>
-</file>
-
-<file path=ppt/notesSlides/notesSlide14.xml><?xml version="1.0" encoding="utf-8"?>
-<p:notes xmlns:a="http://schemas.openxmlformats.org/drawingml/2006/main" xmlns:r="http://schemas.openxmlformats.org/officeDocument/2006/relationships" xmlns:p="http://schemas.openxmlformats.org/presentationml/2006/main" showMasterSp="0" showMasterPhAnim="0">
-  <p:cSld>
-    <p:spTree>
-      <p:nvGrpSpPr>
         <p:cNvPr id="1" name="Shape 254"/>
         <p:cNvGrpSpPr/>
         <p:nvPr/>
@@ -2160,7 +2055,7 @@
 </p:notes>
 </file>
 
-<file path=ppt/notesSlides/notesSlide15.xml><?xml version="1.0" encoding="utf-8"?>
+<file path=ppt/notesSlides/notesSlide14.xml><?xml version="1.0" encoding="utf-8"?>
 <p:notes xmlns:a="http://schemas.openxmlformats.org/drawingml/2006/main" xmlns:r="http://schemas.openxmlformats.org/officeDocument/2006/relationships" xmlns:p="http://schemas.openxmlformats.org/presentationml/2006/main" showMasterSp="0" showMasterPhAnim="0">
   <p:cSld>
     <p:spTree>
@@ -2437,7 +2332,7 @@
   <p:cSld>
     <p:spTree>
       <p:nvGrpSpPr>
-        <p:cNvPr id="1" name="Shape 141"/>
+        <p:cNvPr id="1" name="Shape 155"/>
         <p:cNvGrpSpPr/>
         <p:nvPr/>
       </p:nvGrpSpPr>
@@ -2451,7 +2346,7 @@
       </p:grpSpPr>
       <p:sp>
         <p:nvSpPr>
-          <p:cNvPr id="142" name="Google Shape;142;p8:notes"/>
+          <p:cNvPr id="156" name="Google Shape;156;p9:notes"/>
           <p:cNvSpPr txBox="1">
             <a:spLocks noGrp="1"/>
           </p:cNvSpPr>
@@ -2489,7 +2384,7 @@
       </p:sp>
       <p:sp>
         <p:nvSpPr>
-          <p:cNvPr id="143" name="Google Shape;143;p8:notes"/>
+          <p:cNvPr id="157" name="Google Shape;157;p9:notes"/>
           <p:cNvSpPr>
             <a:spLocks noGrp="1" noRot="1" noChangeAspect="1"/>
           </p:cNvSpPr>
@@ -2541,7 +2436,7 @@
   <p:cSld>
     <p:spTree>
       <p:nvGrpSpPr>
-        <p:cNvPr id="1" name="Shape 155"/>
+        <p:cNvPr id="1" name="Shape 163"/>
         <p:cNvGrpSpPr/>
         <p:nvPr/>
       </p:nvGrpSpPr>
@@ -2555,7 +2450,7 @@
       </p:grpSpPr>
       <p:sp>
         <p:nvSpPr>
-          <p:cNvPr id="156" name="Google Shape;156;p9:notes"/>
+          <p:cNvPr id="164" name="Google Shape;164;p10:notes"/>
           <p:cNvSpPr txBox="1">
             <a:spLocks noGrp="1"/>
           </p:cNvSpPr>
@@ -2593,7 +2488,7 @@
       </p:sp>
       <p:sp>
         <p:nvSpPr>
-          <p:cNvPr id="157" name="Google Shape;157;p9:notes"/>
+          <p:cNvPr id="165" name="Google Shape;165;p10:notes"/>
           <p:cNvSpPr>
             <a:spLocks noGrp="1" noRot="1" noChangeAspect="1"/>
           </p:cNvSpPr>
@@ -2645,7 +2540,7 @@
   <p:cSld>
     <p:spTree>
       <p:nvGrpSpPr>
-        <p:cNvPr id="1" name="Shape 163"/>
+        <p:cNvPr id="1" name="Shape 179"/>
         <p:cNvGrpSpPr/>
         <p:nvPr/>
       </p:nvGrpSpPr>
@@ -2659,7 +2554,7 @@
       </p:grpSpPr>
       <p:sp>
         <p:nvSpPr>
-          <p:cNvPr id="164" name="Google Shape;164;p10:notes"/>
+          <p:cNvPr id="180" name="Google Shape;180;p12:notes"/>
           <p:cNvSpPr txBox="1">
             <a:spLocks noGrp="1"/>
           </p:cNvSpPr>
@@ -2697,7 +2592,7 @@
       </p:sp>
       <p:sp>
         <p:nvSpPr>
-          <p:cNvPr id="165" name="Google Shape;165;p10:notes"/>
+          <p:cNvPr id="181" name="Google Shape;181;p12:notes"/>
           <p:cNvSpPr>
             <a:spLocks noGrp="1" noRot="1" noChangeAspect="1"/>
           </p:cNvSpPr>
@@ -2749,7 +2644,7 @@
   <p:cSld>
     <p:spTree>
       <p:nvGrpSpPr>
-        <p:cNvPr id="1" name="Shape 179"/>
+        <p:cNvPr id="1" name="Shape 188"/>
         <p:cNvGrpSpPr/>
         <p:nvPr/>
       </p:nvGrpSpPr>
@@ -2763,7 +2658,7 @@
       </p:grpSpPr>
       <p:sp>
         <p:nvSpPr>
-          <p:cNvPr id="180" name="Google Shape;180;p12:notes"/>
+          <p:cNvPr id="189" name="Google Shape;189;p13:notes"/>
           <p:cNvSpPr txBox="1">
             <a:spLocks noGrp="1"/>
           </p:cNvSpPr>
@@ -2801,7 +2696,7 @@
       </p:sp>
       <p:sp>
         <p:nvSpPr>
-          <p:cNvPr id="181" name="Google Shape;181;p12:notes"/>
+          <p:cNvPr id="190" name="Google Shape;190;p13:notes"/>
           <p:cNvSpPr>
             <a:spLocks noGrp="1" noRot="1" noChangeAspect="1"/>
           </p:cNvSpPr>
@@ -2853,7 +2748,7 @@
   <p:cSld>
     <p:spTree>
       <p:nvGrpSpPr>
-        <p:cNvPr id="1" name="Shape 188"/>
+        <p:cNvPr id="1" name="Shape 194"/>
         <p:cNvGrpSpPr/>
         <p:nvPr/>
       </p:nvGrpSpPr>
@@ -2867,7 +2762,7 @@
       </p:grpSpPr>
       <p:sp>
         <p:nvSpPr>
-          <p:cNvPr id="189" name="Google Shape;189;p13:notes"/>
+          <p:cNvPr id="195" name="Google Shape;195;p14:notes"/>
           <p:cNvSpPr txBox="1">
             <a:spLocks noGrp="1"/>
           </p:cNvSpPr>
@@ -2905,7 +2800,7 @@
       </p:sp>
       <p:sp>
         <p:nvSpPr>
-          <p:cNvPr id="190" name="Google Shape;190;p13:notes"/>
+          <p:cNvPr id="196" name="Google Shape;196;p14:notes"/>
           <p:cNvSpPr>
             <a:spLocks noGrp="1" noRot="1" noChangeAspect="1"/>
           </p:cNvSpPr>
@@ -2957,7 +2852,7 @@
   <p:cSld>
     <p:spTree>
       <p:nvGrpSpPr>
-        <p:cNvPr id="1" name="Shape 194"/>
+        <p:cNvPr id="1" name="Shape 204"/>
         <p:cNvGrpSpPr/>
         <p:nvPr/>
       </p:nvGrpSpPr>
@@ -2971,7 +2866,7 @@
       </p:grpSpPr>
       <p:sp>
         <p:nvSpPr>
-          <p:cNvPr id="195" name="Google Shape;195;p14:notes"/>
+          <p:cNvPr id="205" name="Google Shape;205;p15:notes"/>
           <p:cNvSpPr txBox="1">
             <a:spLocks noGrp="1"/>
           </p:cNvSpPr>
@@ -3009,7 +2904,7 @@
       </p:sp>
       <p:sp>
         <p:nvSpPr>
-          <p:cNvPr id="196" name="Google Shape;196;p14:notes"/>
+          <p:cNvPr id="206" name="Google Shape;206;p15:notes"/>
           <p:cNvSpPr>
             <a:spLocks noGrp="1" noRot="1" noChangeAspect="1"/>
           </p:cNvSpPr>
@@ -3061,7 +2956,7 @@
   <p:cSld>
     <p:spTree>
       <p:nvGrpSpPr>
-        <p:cNvPr id="1" name="Shape 204"/>
+        <p:cNvPr id="1" name="Shape 216"/>
         <p:cNvGrpSpPr/>
         <p:nvPr/>
       </p:nvGrpSpPr>
@@ -3075,7 +2970,7 @@
       </p:grpSpPr>
       <p:sp>
         <p:nvSpPr>
-          <p:cNvPr id="205" name="Google Shape;205;p15:notes"/>
+          <p:cNvPr id="217" name="Google Shape;217;p16:notes"/>
           <p:cNvSpPr txBox="1">
             <a:spLocks noGrp="1"/>
           </p:cNvSpPr>
@@ -3113,7 +3008,7 @@
       </p:sp>
       <p:sp>
         <p:nvSpPr>
-          <p:cNvPr id="206" name="Google Shape;206;p15:notes"/>
+          <p:cNvPr id="218" name="Google Shape;218;p16:notes"/>
           <p:cNvSpPr>
             <a:spLocks noGrp="1" noRot="1" noChangeAspect="1"/>
           </p:cNvSpPr>
@@ -13705,723 +13600,6 @@
   <p:cSld>
     <p:spTree>
       <p:nvGrpSpPr>
-        <p:cNvPr id="1" name="Shape 219"/>
-        <p:cNvGrpSpPr/>
-        <p:nvPr/>
-      </p:nvGrpSpPr>
-      <p:grpSpPr>
-        <a:xfrm>
-          <a:off x="0" y="0"/>
-          <a:ext cx="0" cy="0"/>
-          <a:chOff x="0" y="0"/>
-          <a:chExt cx="0" cy="0"/>
-        </a:xfrm>
-      </p:grpSpPr>
-      <p:sp>
-        <p:nvSpPr>
-          <p:cNvPr id="220" name="Google Shape;220;p16"/>
-          <p:cNvSpPr txBox="1">
-            <a:spLocks noGrp="1"/>
-          </p:cNvSpPr>
-          <p:nvPr>
-            <p:ph type="title"/>
-          </p:nvPr>
-        </p:nvSpPr>
-        <p:spPr>
-          <a:xfrm>
-            <a:off x="575894" y="729658"/>
-            <a:ext cx="11029616" cy="612445"/>
-          </a:xfrm>
-          <a:prstGeom prst="rect">
-            <a:avLst/>
-          </a:prstGeom>
-          <a:noFill/>
-          <a:ln>
-            <a:noFill/>
-          </a:ln>
-        </p:spPr>
-        <p:txBody>
-          <a:bodyPr spcFirstLastPara="1" wrap="square" lIns="91425" tIns="45700" rIns="91425" bIns="45700" anchor="b" anchorCtr="0">
-            <a:normAutofit/>
-          </a:bodyPr>
-          <a:lstStyle/>
-          <a:p>
-            <a:pPr marL="0" lvl="0" indent="0" algn="l" rtl="0">
-              <a:lnSpc>
-                <a:spcPct val="100000"/>
-              </a:lnSpc>
-              <a:spcBef>
-                <a:spcPts val="0"/>
-              </a:spcBef>
-              <a:spcAft>
-                <a:spcPts val="0"/>
-              </a:spcAft>
-              <a:buClr>
-                <a:srgbClr val="3F3F3F"/>
-              </a:buClr>
-              <a:buSzPts val="2800"/>
-              <a:buFont typeface="Franklin Gothic"/>
-              <a:buNone/>
-            </a:pPr>
-            <a:r>
-              <a:rPr lang="en-US"/>
-              <a:t>COMBINING STRING FUNCTIONS</a:t>
-            </a:r>
-            <a:endParaRPr/>
-          </a:p>
-        </p:txBody>
-      </p:sp>
-      <p:sp>
-        <p:nvSpPr>
-          <p:cNvPr id="221" name="Google Shape;221;p16"/>
-          <p:cNvSpPr txBox="1">
-            <a:spLocks noGrp="1"/>
-          </p:cNvSpPr>
-          <p:nvPr>
-            <p:ph type="sldNum" idx="12"/>
-          </p:nvPr>
-        </p:nvSpPr>
-        <p:spPr>
-          <a:xfrm>
-            <a:off x="10558300" y="6423914"/>
-            <a:ext cx="1052510" cy="365125"/>
-          </a:xfrm>
-          <a:prstGeom prst="rect">
-            <a:avLst/>
-          </a:prstGeom>
-          <a:noFill/>
-          <a:ln>
-            <a:noFill/>
-          </a:ln>
-        </p:spPr>
-        <p:txBody>
-          <a:bodyPr spcFirstLastPara="1" wrap="square" lIns="91425" tIns="45700" rIns="91425" bIns="45700" anchor="ctr" anchorCtr="0">
-            <a:noAutofit/>
-          </a:bodyPr>
-          <a:lstStyle/>
-          <a:p>
-            <a:pPr marL="0" lvl="0" indent="0" algn="r" rtl="0">
-              <a:spcBef>
-                <a:spcPts val="0"/>
-              </a:spcBef>
-              <a:spcAft>
-                <a:spcPts val="0"/>
-              </a:spcAft>
-              <a:buNone/>
-            </a:pPr>
-            <a:fld id="{00000000-1234-1234-1234-123412341234}" type="slidenum">
-              <a:rPr lang="en-US"/>
-              <a:t>10</a:t>
-            </a:fld>
-            <a:endParaRPr/>
-          </a:p>
-        </p:txBody>
-      </p:sp>
-      <p:sp>
-        <p:nvSpPr>
-          <p:cNvPr id="222" name="Google Shape;222;p16"/>
-          <p:cNvSpPr txBox="1"/>
-          <p:nvPr/>
-        </p:nvSpPr>
-        <p:spPr>
-          <a:xfrm>
-            <a:off x="615750" y="1800341"/>
-            <a:ext cx="5386849" cy="1631216"/>
-          </a:xfrm>
-          <a:prstGeom prst="rect">
-            <a:avLst/>
-          </a:prstGeom>
-          <a:noFill/>
-          <a:ln>
-            <a:noFill/>
-          </a:ln>
-        </p:spPr>
-        <p:txBody>
-          <a:bodyPr spcFirstLastPara="1" wrap="square" lIns="91425" tIns="45700" rIns="91425" bIns="45700" anchor="t" anchorCtr="0">
-            <a:spAutoFit/>
-          </a:bodyPr>
-          <a:lstStyle/>
-          <a:p>
-            <a:pPr marL="0" marR="0" lvl="0" indent="0" algn="l" rtl="0">
-              <a:spcBef>
-                <a:spcPts val="0"/>
-              </a:spcBef>
-              <a:spcAft>
-                <a:spcPts val="0"/>
-              </a:spcAft>
-              <a:buNone/>
-            </a:pPr>
-            <a:r>
-              <a:rPr lang="en-US" sz="2000">
-                <a:solidFill>
-                  <a:srgbClr val="0E0E0E"/>
-                </a:solidFill>
-                <a:latin typeface="Arial"/>
-                <a:ea typeface="Arial"/>
-                <a:cs typeface="Arial"/>
-                <a:sym typeface="Arial"/>
-              </a:rPr>
-              <a:t>You can also combine these functions for more complex string manipulations.</a:t>
-            </a:r>
-            <a:endParaRPr/>
-          </a:p>
-          <a:p>
-            <a:pPr marL="0" marR="0" lvl="0" indent="0" algn="l" rtl="0">
-              <a:spcBef>
-                <a:spcPts val="0"/>
-              </a:spcBef>
-              <a:spcAft>
-                <a:spcPts val="0"/>
-              </a:spcAft>
-              <a:buNone/>
-            </a:pPr>
-            <a:endParaRPr sz="2000">
-              <a:solidFill>
-                <a:srgbClr val="0E0E0E"/>
-              </a:solidFill>
-              <a:latin typeface="Arial"/>
-              <a:ea typeface="Arial"/>
-              <a:cs typeface="Arial"/>
-              <a:sym typeface="Arial"/>
-            </a:endParaRPr>
-          </a:p>
-          <a:p>
-            <a:pPr marL="0" marR="0" lvl="0" indent="0" algn="l" rtl="0">
-              <a:spcBef>
-                <a:spcPts val="0"/>
-              </a:spcBef>
-              <a:spcAft>
-                <a:spcPts val="0"/>
-              </a:spcAft>
-              <a:buNone/>
-            </a:pPr>
-            <a:r>
-              <a:rPr lang="en-US" sz="2000" b="1">
-                <a:solidFill>
-                  <a:srgbClr val="0E0E0E"/>
-                </a:solidFill>
-                <a:latin typeface="Arial"/>
-                <a:ea typeface="Arial"/>
-                <a:cs typeface="Arial"/>
-                <a:sym typeface="Arial"/>
-              </a:rPr>
-              <a:t>Example: Concatenating a cleaned full name and lowercased email address</a:t>
-            </a:r>
-            <a:endParaRPr sz="2000">
-              <a:solidFill>
-                <a:srgbClr val="0E0E0E"/>
-              </a:solidFill>
-              <a:latin typeface="Arial"/>
-              <a:ea typeface="Arial"/>
-              <a:cs typeface="Arial"/>
-              <a:sym typeface="Arial"/>
-            </a:endParaRPr>
-          </a:p>
-        </p:txBody>
-      </p:sp>
-      <p:sp>
-        <p:nvSpPr>
-          <p:cNvPr id="223" name="Google Shape;223;p16"/>
-          <p:cNvSpPr txBox="1"/>
-          <p:nvPr/>
-        </p:nvSpPr>
-        <p:spPr>
-          <a:xfrm>
-            <a:off x="727501" y="3669494"/>
-            <a:ext cx="9124422" cy="1200329"/>
-          </a:xfrm>
-          <a:prstGeom prst="rect">
-            <a:avLst/>
-          </a:prstGeom>
-          <a:solidFill>
-            <a:srgbClr val="F2F2F2"/>
-          </a:solidFill>
-          <a:ln>
-            <a:noFill/>
-          </a:ln>
-        </p:spPr>
-        <p:txBody>
-          <a:bodyPr spcFirstLastPara="1" wrap="square" lIns="91425" tIns="45700" rIns="91425" bIns="45700" anchor="t" anchorCtr="0">
-            <a:spAutoFit/>
-          </a:bodyPr>
-          <a:lstStyle/>
-          <a:p>
-            <a:pPr marL="0" marR="0" lvl="0" indent="0" algn="l" rtl="0">
-              <a:spcBef>
-                <a:spcPts val="0"/>
-              </a:spcBef>
-              <a:spcAft>
-                <a:spcPts val="0"/>
-              </a:spcAft>
-              <a:buNone/>
-            </a:pPr>
-            <a:r>
-              <a:rPr lang="en-US" sz="1800" b="1">
-                <a:solidFill>
-                  <a:srgbClr val="800000"/>
-                </a:solidFill>
-                <a:latin typeface="Arial"/>
-                <a:ea typeface="Arial"/>
-                <a:cs typeface="Arial"/>
-                <a:sym typeface="Arial"/>
-              </a:rPr>
-              <a:t>SELECT</a:t>
-            </a:r>
-            <a:r>
-              <a:rPr lang="en-US" sz="1800">
-                <a:solidFill>
-                  <a:srgbClr val="000000"/>
-                </a:solidFill>
-                <a:latin typeface="Arial"/>
-                <a:ea typeface="Arial"/>
-                <a:cs typeface="Arial"/>
-                <a:sym typeface="Arial"/>
-              </a:rPr>
-              <a:t> </a:t>
-            </a:r>
-            <a:r>
-              <a:rPr lang="en-US" sz="1800">
-                <a:solidFill>
-                  <a:srgbClr val="006464"/>
-                </a:solidFill>
-                <a:latin typeface="Arial"/>
-                <a:ea typeface="Arial"/>
-                <a:cs typeface="Arial"/>
-                <a:sym typeface="Arial"/>
-              </a:rPr>
-              <a:t>CustomerID</a:t>
-            </a:r>
-            <a:r>
-              <a:rPr lang="en-US" sz="1800">
-                <a:solidFill>
-                  <a:srgbClr val="000000"/>
-                </a:solidFill>
-                <a:latin typeface="Arial"/>
-                <a:ea typeface="Arial"/>
-                <a:cs typeface="Arial"/>
-                <a:sym typeface="Arial"/>
-              </a:rPr>
-              <a:t>, CONCAT(</a:t>
-            </a:r>
-            <a:r>
-              <a:rPr lang="en-US" sz="1800" b="1">
-                <a:solidFill>
-                  <a:srgbClr val="000080"/>
-                </a:solidFill>
-                <a:latin typeface="Arial"/>
-                <a:ea typeface="Arial"/>
-                <a:cs typeface="Arial"/>
-                <a:sym typeface="Arial"/>
-              </a:rPr>
-              <a:t>TRIM</a:t>
-            </a:r>
-            <a:r>
-              <a:rPr lang="en-US" sz="1800">
-                <a:solidFill>
-                  <a:srgbClr val="000000"/>
-                </a:solidFill>
-                <a:latin typeface="Arial"/>
-                <a:ea typeface="Arial"/>
-                <a:cs typeface="Arial"/>
-                <a:sym typeface="Arial"/>
-              </a:rPr>
-              <a:t>(</a:t>
-            </a:r>
-            <a:r>
-              <a:rPr lang="en-US" sz="1800" b="1" i="1" u="sng">
-                <a:solidFill>
-                  <a:srgbClr val="FF3737"/>
-                </a:solidFill>
-                <a:latin typeface="Arial"/>
-                <a:ea typeface="Arial"/>
-                <a:cs typeface="Arial"/>
-                <a:sym typeface="Arial"/>
-              </a:rPr>
-              <a:t>FirstName</a:t>
-            </a:r>
-            <a:r>
-              <a:rPr lang="en-US" sz="1800">
-                <a:solidFill>
-                  <a:srgbClr val="000000"/>
-                </a:solidFill>
-                <a:latin typeface="Arial"/>
-                <a:ea typeface="Arial"/>
-                <a:cs typeface="Arial"/>
-                <a:sym typeface="Arial"/>
-              </a:rPr>
-              <a:t>), </a:t>
-            </a:r>
-            <a:r>
-              <a:rPr lang="en-US" sz="1800" b="1">
-                <a:solidFill>
-                  <a:srgbClr val="008000"/>
-                </a:solidFill>
-                <a:latin typeface="Arial"/>
-                <a:ea typeface="Arial"/>
-                <a:cs typeface="Arial"/>
-                <a:sym typeface="Arial"/>
-              </a:rPr>
-              <a:t>' '</a:t>
-            </a:r>
-            <a:r>
-              <a:rPr lang="en-US" sz="1800">
-                <a:solidFill>
-                  <a:srgbClr val="000000"/>
-                </a:solidFill>
-                <a:latin typeface="Arial"/>
-                <a:ea typeface="Arial"/>
-                <a:cs typeface="Arial"/>
-                <a:sym typeface="Arial"/>
-              </a:rPr>
-              <a:t>, </a:t>
-            </a:r>
-            <a:r>
-              <a:rPr lang="en-US" sz="1800" b="1">
-                <a:solidFill>
-                  <a:srgbClr val="000080"/>
-                </a:solidFill>
-                <a:latin typeface="Arial"/>
-                <a:ea typeface="Arial"/>
-                <a:cs typeface="Arial"/>
-                <a:sym typeface="Arial"/>
-              </a:rPr>
-              <a:t>TRIM</a:t>
-            </a:r>
-            <a:r>
-              <a:rPr lang="en-US" sz="1800">
-                <a:solidFill>
-                  <a:srgbClr val="000000"/>
-                </a:solidFill>
-                <a:latin typeface="Arial"/>
-                <a:ea typeface="Arial"/>
-                <a:cs typeface="Arial"/>
-                <a:sym typeface="Arial"/>
-              </a:rPr>
-              <a:t>(</a:t>
-            </a:r>
-            <a:r>
-              <a:rPr lang="en-US" sz="1800" b="1" i="1" u="sng">
-                <a:solidFill>
-                  <a:srgbClr val="FF3737"/>
-                </a:solidFill>
-                <a:latin typeface="Arial"/>
-                <a:ea typeface="Arial"/>
-                <a:cs typeface="Arial"/>
-                <a:sym typeface="Arial"/>
-              </a:rPr>
-              <a:t>LastName</a:t>
-            </a:r>
-            <a:r>
-              <a:rPr lang="en-US" sz="1800">
-                <a:solidFill>
-                  <a:srgbClr val="000000"/>
-                </a:solidFill>
-                <a:latin typeface="Arial"/>
-                <a:ea typeface="Arial"/>
-                <a:cs typeface="Arial"/>
-                <a:sym typeface="Arial"/>
-              </a:rPr>
-              <a:t>)) </a:t>
-            </a:r>
-            <a:r>
-              <a:rPr lang="en-US" sz="1800" b="1">
-                <a:solidFill>
-                  <a:srgbClr val="800000"/>
-                </a:solidFill>
-                <a:latin typeface="Arial"/>
-                <a:ea typeface="Arial"/>
-                <a:cs typeface="Arial"/>
-                <a:sym typeface="Arial"/>
-              </a:rPr>
-              <a:t>AS</a:t>
-            </a:r>
-            <a:r>
-              <a:rPr lang="en-US" sz="1800">
-                <a:solidFill>
-                  <a:srgbClr val="000000"/>
-                </a:solidFill>
-                <a:latin typeface="Arial"/>
-                <a:ea typeface="Arial"/>
-                <a:cs typeface="Arial"/>
-                <a:sym typeface="Arial"/>
-              </a:rPr>
-              <a:t> </a:t>
-            </a:r>
-            <a:r>
-              <a:rPr lang="en-US" sz="1800" i="1">
-                <a:solidFill>
-                  <a:srgbClr val="006464"/>
-                </a:solidFill>
-                <a:latin typeface="Arial"/>
-                <a:ea typeface="Arial"/>
-                <a:cs typeface="Arial"/>
-                <a:sym typeface="Arial"/>
-              </a:rPr>
-              <a:t>FullName</a:t>
-            </a:r>
-            <a:r>
-              <a:rPr lang="en-US" sz="1800">
-                <a:solidFill>
-                  <a:srgbClr val="000000"/>
-                </a:solidFill>
-                <a:latin typeface="Arial"/>
-                <a:ea typeface="Arial"/>
-                <a:cs typeface="Arial"/>
-                <a:sym typeface="Arial"/>
-              </a:rPr>
-              <a:t>, </a:t>
-            </a:r>
-            <a:endParaRPr/>
-          </a:p>
-          <a:p>
-            <a:pPr marL="0" marR="0" lvl="0" indent="0" algn="l" rtl="0">
-              <a:spcBef>
-                <a:spcPts val="0"/>
-              </a:spcBef>
-              <a:spcAft>
-                <a:spcPts val="0"/>
-              </a:spcAft>
-              <a:buNone/>
-            </a:pPr>
-            <a:r>
-              <a:rPr lang="en-US" sz="1800" b="1">
-                <a:solidFill>
-                  <a:srgbClr val="000080"/>
-                </a:solidFill>
-                <a:latin typeface="Arial"/>
-                <a:ea typeface="Arial"/>
-                <a:cs typeface="Arial"/>
-                <a:sym typeface="Arial"/>
-              </a:rPr>
-              <a:t>LOWER</a:t>
-            </a:r>
-            <a:r>
-              <a:rPr lang="en-US" sz="1800">
-                <a:solidFill>
-                  <a:srgbClr val="000000"/>
-                </a:solidFill>
-                <a:latin typeface="Arial"/>
-                <a:ea typeface="Arial"/>
-                <a:cs typeface="Arial"/>
-                <a:sym typeface="Arial"/>
-              </a:rPr>
-              <a:t>(</a:t>
-            </a:r>
-            <a:r>
-              <a:rPr lang="en-US" sz="1800" b="1" i="1" u="sng">
-                <a:solidFill>
-                  <a:srgbClr val="FF3737"/>
-                </a:solidFill>
-                <a:latin typeface="Arial"/>
-                <a:ea typeface="Arial"/>
-                <a:cs typeface="Arial"/>
-                <a:sym typeface="Arial"/>
-              </a:rPr>
-              <a:t>Email</a:t>
-            </a:r>
-            <a:r>
-              <a:rPr lang="en-US" sz="1800">
-                <a:solidFill>
-                  <a:srgbClr val="000000"/>
-                </a:solidFill>
-                <a:latin typeface="Arial"/>
-                <a:ea typeface="Arial"/>
-                <a:cs typeface="Arial"/>
-                <a:sym typeface="Arial"/>
-              </a:rPr>
-              <a:t>) </a:t>
-            </a:r>
-            <a:r>
-              <a:rPr lang="en-US" sz="1800" b="1">
-                <a:solidFill>
-                  <a:srgbClr val="800000"/>
-                </a:solidFill>
-                <a:latin typeface="Arial"/>
-                <a:ea typeface="Arial"/>
-                <a:cs typeface="Arial"/>
-                <a:sym typeface="Arial"/>
-              </a:rPr>
-              <a:t>AS</a:t>
-            </a:r>
-            <a:r>
-              <a:rPr lang="en-US" sz="1800">
-                <a:solidFill>
-                  <a:srgbClr val="000000"/>
-                </a:solidFill>
-                <a:latin typeface="Arial"/>
-                <a:ea typeface="Arial"/>
-                <a:cs typeface="Arial"/>
-                <a:sym typeface="Arial"/>
-              </a:rPr>
-              <a:t> </a:t>
-            </a:r>
-            <a:r>
-              <a:rPr lang="en-US" sz="1800" i="1">
-                <a:solidFill>
-                  <a:srgbClr val="006464"/>
-                </a:solidFill>
-                <a:latin typeface="Arial"/>
-                <a:ea typeface="Arial"/>
-                <a:cs typeface="Arial"/>
-                <a:sym typeface="Arial"/>
-              </a:rPr>
-              <a:t>LowercaseEmail</a:t>
-            </a:r>
-            <a:endParaRPr sz="1800">
-              <a:solidFill>
-                <a:srgbClr val="000000"/>
-              </a:solidFill>
-              <a:latin typeface="Arial"/>
-              <a:ea typeface="Arial"/>
-              <a:cs typeface="Arial"/>
-              <a:sym typeface="Arial"/>
-            </a:endParaRPr>
-          </a:p>
-          <a:p>
-            <a:pPr marL="0" marR="0" lvl="0" indent="0" algn="l" rtl="0">
-              <a:spcBef>
-                <a:spcPts val="0"/>
-              </a:spcBef>
-              <a:spcAft>
-                <a:spcPts val="0"/>
-              </a:spcAft>
-              <a:buNone/>
-            </a:pPr>
-            <a:r>
-              <a:rPr lang="en-US" sz="1800" b="1">
-                <a:solidFill>
-                  <a:srgbClr val="800000"/>
-                </a:solidFill>
-                <a:latin typeface="Arial"/>
-                <a:ea typeface="Arial"/>
-                <a:cs typeface="Arial"/>
-                <a:sym typeface="Arial"/>
-              </a:rPr>
-              <a:t>FROM</a:t>
-            </a:r>
-            <a:r>
-              <a:rPr lang="en-US" sz="1800">
-                <a:solidFill>
-                  <a:srgbClr val="000000"/>
-                </a:solidFill>
-                <a:latin typeface="Arial"/>
-                <a:ea typeface="Arial"/>
-                <a:cs typeface="Arial"/>
-                <a:sym typeface="Arial"/>
-              </a:rPr>
-              <a:t> </a:t>
-            </a:r>
-            <a:r>
-              <a:rPr lang="en-US" sz="1800">
-                <a:solidFill>
-                  <a:srgbClr val="8E00C6"/>
-                </a:solidFill>
-                <a:latin typeface="Arial"/>
-                <a:ea typeface="Arial"/>
-                <a:cs typeface="Arial"/>
-                <a:sym typeface="Arial"/>
-              </a:rPr>
-              <a:t>VIPCustomer</a:t>
-            </a:r>
-            <a:r>
-              <a:rPr lang="en-US" sz="1800">
-                <a:solidFill>
-                  <a:srgbClr val="FF0000"/>
-                </a:solidFill>
-                <a:latin typeface="Arial"/>
-                <a:ea typeface="Arial"/>
-                <a:cs typeface="Arial"/>
-                <a:sym typeface="Arial"/>
-              </a:rPr>
-              <a:t>;</a:t>
-            </a:r>
-            <a:endParaRPr sz="1800">
-              <a:solidFill>
-                <a:srgbClr val="000000"/>
-              </a:solidFill>
-              <a:latin typeface="Arial"/>
-              <a:ea typeface="Arial"/>
-              <a:cs typeface="Arial"/>
-              <a:sym typeface="Arial"/>
-            </a:endParaRPr>
-          </a:p>
-        </p:txBody>
-      </p:sp>
-      <p:sp>
-        <p:nvSpPr>
-          <p:cNvPr id="224" name="Google Shape;224;p16"/>
-          <p:cNvSpPr txBox="1"/>
-          <p:nvPr/>
-        </p:nvSpPr>
-        <p:spPr>
-          <a:xfrm>
-            <a:off x="615749" y="5107760"/>
-            <a:ext cx="9236173" cy="646331"/>
-          </a:xfrm>
-          <a:prstGeom prst="rect">
-            <a:avLst/>
-          </a:prstGeom>
-          <a:noFill/>
-          <a:ln>
-            <a:noFill/>
-          </a:ln>
-        </p:spPr>
-        <p:txBody>
-          <a:bodyPr spcFirstLastPara="1" wrap="square" lIns="91425" tIns="45700" rIns="91425" bIns="45700" anchor="t" anchorCtr="0">
-            <a:spAutoFit/>
-          </a:bodyPr>
-          <a:lstStyle/>
-          <a:p>
-            <a:pPr marL="0" marR="0" lvl="0" indent="0" algn="l" rtl="0">
-              <a:spcBef>
-                <a:spcPts val="0"/>
-              </a:spcBef>
-              <a:spcAft>
-                <a:spcPts val="0"/>
-              </a:spcAft>
-              <a:buNone/>
-            </a:pPr>
-            <a:r>
-              <a:rPr lang="en-US" sz="1800" b="1">
-                <a:solidFill>
-                  <a:srgbClr val="0E0E0E"/>
-                </a:solidFill>
-                <a:latin typeface="Arial"/>
-                <a:ea typeface="Arial"/>
-                <a:cs typeface="Arial"/>
-                <a:sym typeface="Arial"/>
-              </a:rPr>
-              <a:t>Explanation</a:t>
-            </a:r>
-            <a:r>
-              <a:rPr lang="en-US" sz="1800">
-                <a:solidFill>
-                  <a:srgbClr val="0E0E0E"/>
-                </a:solidFill>
-                <a:latin typeface="Arial"/>
-                <a:ea typeface="Arial"/>
-                <a:cs typeface="Arial"/>
-                <a:sym typeface="Arial"/>
-              </a:rPr>
-              <a:t>: This query trims any extra spaces from FirstName and LastName, concatenates them into a full name, and converts the Email to lowercase.</a:t>
-            </a:r>
-            <a:endParaRPr/>
-          </a:p>
-        </p:txBody>
-      </p:sp>
-    </p:spTree>
-  </p:cSld>
-  <p:clrMapOvr>
-    <a:masterClrMapping/>
-  </p:clrMapOvr>
-</p:sld>
-</file>
-
-<file path=ppt/slides/slide11.xml><?xml version="1.0" encoding="utf-8"?>
-<p:sld xmlns:a="http://schemas.openxmlformats.org/drawingml/2006/main" xmlns:r="http://schemas.openxmlformats.org/officeDocument/2006/relationships" xmlns:p="http://schemas.openxmlformats.org/presentationml/2006/main">
-  <p:cSld>
-    <p:spTree>
-      <p:nvGrpSpPr>
         <p:cNvPr id="1" name="Shape 228"/>
         <p:cNvGrpSpPr/>
         <p:nvPr/>
@@ -14528,7 +13706,7 @@
             </a:pPr>
             <a:fld id="{00000000-1234-1234-1234-123412341234}" type="slidenum">
               <a:rPr lang="en-US"/>
-              <a:t>11</a:t>
+              <a:t>10</a:t>
             </a:fld>
             <a:endParaRPr/>
           </a:p>
@@ -16098,7 +15276,7 @@
 </p:sld>
 </file>
 
-<file path=ppt/slides/slide12.xml><?xml version="1.0" encoding="utf-8"?>
+<file path=ppt/slides/slide11.xml><?xml version="1.0" encoding="utf-8"?>
 <p:sld xmlns:a="http://schemas.openxmlformats.org/drawingml/2006/main" xmlns:r="http://schemas.openxmlformats.org/officeDocument/2006/relationships" xmlns:p="http://schemas.openxmlformats.org/presentationml/2006/main">
   <p:cSld>
     <p:spTree>
@@ -16204,7 +15382,7 @@
 </p:sld>
 </file>
 
-<file path=ppt/slides/slide13.xml><?xml version="1.0" encoding="utf-8"?>
+<file path=ppt/slides/slide12.xml><?xml version="1.0" encoding="utf-8"?>
 <p:sld xmlns:a="http://schemas.openxmlformats.org/drawingml/2006/main" xmlns:r="http://schemas.openxmlformats.org/officeDocument/2006/relationships" xmlns:p="http://schemas.openxmlformats.org/presentationml/2006/main">
   <p:cSld>
     <p:spTree>
@@ -16315,7 +15493,7 @@
             </a:pPr>
             <a:fld id="{00000000-1234-1234-1234-123412341234}" type="slidenum">
               <a:rPr lang="en-US"/>
-              <a:t>13</a:t>
+              <a:t>12</a:t>
             </a:fld>
             <a:endParaRPr/>
           </a:p>
@@ -16821,7 +15999,7 @@
 </p:sld>
 </file>
 
-<file path=ppt/slides/slide14.xml><?xml version="1.0" encoding="utf-8"?>
+<file path=ppt/slides/slide13.xml><?xml version="1.0" encoding="utf-8"?>
 <p:sld xmlns:a="http://schemas.openxmlformats.org/drawingml/2006/main" xmlns:r="http://schemas.openxmlformats.org/officeDocument/2006/relationships" xmlns:p="http://schemas.openxmlformats.org/presentationml/2006/main">
   <p:cSld>
     <p:spTree>
@@ -16944,7 +16122,7 @@
             </a:pPr>
             <a:fld id="{00000000-1234-1234-1234-123412341234}" type="slidenum">
               <a:rPr lang="en-US"/>
-              <a:t>14</a:t>
+              <a:t>13</a:t>
             </a:fld>
             <a:endParaRPr/>
           </a:p>
@@ -17450,7 +16628,7 @@
 </p:sld>
 </file>
 
-<file path=ppt/slides/slide15.xml><?xml version="1.0" encoding="utf-8"?>
+<file path=ppt/slides/slide14.xml><?xml version="1.0" encoding="utf-8"?>
 <p:sld xmlns:a="http://schemas.openxmlformats.org/drawingml/2006/main" xmlns:r="http://schemas.openxmlformats.org/officeDocument/2006/relationships" xmlns:p="http://schemas.openxmlformats.org/presentationml/2006/main">
   <p:cSld>
     <p:spTree>
@@ -17573,7 +16751,7 @@
             </a:pPr>
             <a:fld id="{00000000-1234-1234-1234-123412341234}" type="slidenum">
               <a:rPr lang="en-US"/>
-              <a:t>15</a:t>
+              <a:t>14</a:t>
             </a:fld>
             <a:endParaRPr/>
           </a:p>
@@ -18496,7 +17674,7 @@
 </file>
 
 <file path=ppt/slides/slide2.xml><?xml version="1.0" encoding="utf-8"?>
-<p:sld xmlns:a="http://schemas.openxmlformats.org/drawingml/2006/main" xmlns:r="http://schemas.openxmlformats.org/officeDocument/2006/relationships" xmlns:p="http://schemas.openxmlformats.org/presentationml/2006/main">
+<p:sld xmlns:a="http://schemas.openxmlformats.org/drawingml/2006/main" xmlns:r="http://schemas.openxmlformats.org/officeDocument/2006/relationships" xmlns:p="http://schemas.openxmlformats.org/presentationml/2006/main" show="0">
   <p:cSld>
     <p:spTree>
       <p:nvGrpSpPr>
@@ -20407,1145 +19585,6 @@
   <p:cSld>
     <p:spTree>
       <p:nvGrpSpPr>
-        <p:cNvPr id="1" name="Shape 144"/>
-        <p:cNvGrpSpPr/>
-        <p:nvPr/>
-      </p:nvGrpSpPr>
-      <p:grpSpPr>
-        <a:xfrm>
-          <a:off x="0" y="0"/>
-          <a:ext cx="0" cy="0"/>
-          <a:chOff x="0" y="0"/>
-          <a:chExt cx="0" cy="0"/>
-        </a:xfrm>
-      </p:grpSpPr>
-      <p:sp>
-        <p:nvSpPr>
-          <p:cNvPr id="145" name="Google Shape;145;p8"/>
-          <p:cNvSpPr txBox="1">
-            <a:spLocks noGrp="1"/>
-          </p:cNvSpPr>
-          <p:nvPr>
-            <p:ph type="title"/>
-          </p:nvPr>
-        </p:nvSpPr>
-        <p:spPr>
-          <a:xfrm>
-            <a:off x="575894" y="729659"/>
-            <a:ext cx="2180185" cy="545350"/>
-          </a:xfrm>
-          <a:prstGeom prst="rect">
-            <a:avLst/>
-          </a:prstGeom>
-          <a:noFill/>
-          <a:ln>
-            <a:noFill/>
-          </a:ln>
-        </p:spPr>
-        <p:txBody>
-          <a:bodyPr spcFirstLastPara="1" wrap="square" lIns="91425" tIns="45700" rIns="91425" bIns="45700" anchor="b" anchorCtr="0">
-            <a:normAutofit/>
-          </a:bodyPr>
-          <a:lstStyle/>
-          <a:p>
-            <a:pPr marL="0" lvl="0" indent="0" algn="l" rtl="0">
-              <a:lnSpc>
-                <a:spcPct val="100000"/>
-              </a:lnSpc>
-              <a:spcBef>
-                <a:spcPts val="0"/>
-              </a:spcBef>
-              <a:spcAft>
-                <a:spcPts val="0"/>
-              </a:spcAft>
-              <a:buClr>
-                <a:srgbClr val="3F3F3F"/>
-              </a:buClr>
-              <a:buSzPts val="2800"/>
-              <a:buFont typeface="Franklin Gothic"/>
-              <a:buNone/>
-            </a:pPr>
-            <a:r>
-              <a:rPr lang="en-US"/>
-              <a:t>DISTINCT</a:t>
-            </a:r>
-            <a:endParaRPr/>
-          </a:p>
-        </p:txBody>
-      </p:sp>
-      <p:sp>
-        <p:nvSpPr>
-          <p:cNvPr id="146" name="Google Shape;146;p8"/>
-          <p:cNvSpPr txBox="1">
-            <a:spLocks noGrp="1"/>
-          </p:cNvSpPr>
-          <p:nvPr>
-            <p:ph type="sldNum" idx="12"/>
-          </p:nvPr>
-        </p:nvSpPr>
-        <p:spPr>
-          <a:xfrm>
-            <a:off x="10558300" y="6423914"/>
-            <a:ext cx="1052510" cy="365125"/>
-          </a:xfrm>
-          <a:prstGeom prst="rect">
-            <a:avLst/>
-          </a:prstGeom>
-          <a:noFill/>
-          <a:ln>
-            <a:noFill/>
-          </a:ln>
-        </p:spPr>
-        <p:txBody>
-          <a:bodyPr spcFirstLastPara="1" wrap="square" lIns="91425" tIns="45700" rIns="91425" bIns="45700" anchor="ctr" anchorCtr="0">
-            <a:noAutofit/>
-          </a:bodyPr>
-          <a:lstStyle/>
-          <a:p>
-            <a:pPr marL="0" lvl="0" indent="0" algn="r" rtl="0">
-              <a:spcBef>
-                <a:spcPts val="0"/>
-              </a:spcBef>
-              <a:spcAft>
-                <a:spcPts val="0"/>
-              </a:spcAft>
-              <a:buNone/>
-            </a:pPr>
-            <a:fld id="{00000000-1234-1234-1234-123412341234}" type="slidenum">
-              <a:rPr lang="en-US"/>
-              <a:t>3</a:t>
-            </a:fld>
-            <a:endParaRPr/>
-          </a:p>
-        </p:txBody>
-      </p:sp>
-      <p:sp>
-        <p:nvSpPr>
-          <p:cNvPr id="147" name="Google Shape;147;p8"/>
-          <p:cNvSpPr txBox="1"/>
-          <p:nvPr/>
-        </p:nvSpPr>
-        <p:spPr>
-          <a:xfrm>
-            <a:off x="575894" y="1397675"/>
-            <a:ext cx="5520106" cy="2031325"/>
-          </a:xfrm>
-          <a:prstGeom prst="rect">
-            <a:avLst/>
-          </a:prstGeom>
-          <a:noFill/>
-          <a:ln>
-            <a:noFill/>
-          </a:ln>
-        </p:spPr>
-        <p:txBody>
-          <a:bodyPr spcFirstLastPara="1" wrap="square" lIns="91425" tIns="45700" rIns="91425" bIns="45700" anchor="t" anchorCtr="0">
-            <a:spAutoFit/>
-          </a:bodyPr>
-          <a:lstStyle/>
-          <a:p>
-            <a:pPr marL="285750" marR="0" lvl="0" indent="-285750" algn="l" rtl="0">
-              <a:spcBef>
-                <a:spcPts val="0"/>
-              </a:spcBef>
-              <a:spcAft>
-                <a:spcPts val="0"/>
-              </a:spcAft>
-              <a:buClr>
-                <a:schemeClr val="accent1"/>
-              </a:buClr>
-              <a:buSzPts val="1800"/>
-              <a:buFont typeface="Noto Sans Symbols"/>
-              <a:buChar char="▪"/>
-            </a:pPr>
-            <a:r>
-              <a:rPr lang="en-US" sz="1800">
-                <a:solidFill>
-                  <a:srgbClr val="0E0E0E"/>
-                </a:solidFill>
-                <a:latin typeface="Arial"/>
-                <a:ea typeface="Arial"/>
-                <a:cs typeface="Arial"/>
-                <a:sym typeface="Arial"/>
-              </a:rPr>
-              <a:t>The SQL DISTINCT clause is used to remove duplicate values from a result set. </a:t>
-            </a:r>
-            <a:endParaRPr/>
-          </a:p>
-          <a:p>
-            <a:pPr marL="285750" marR="0" lvl="0" indent="-285750" algn="l" rtl="0">
-              <a:spcBef>
-                <a:spcPts val="0"/>
-              </a:spcBef>
-              <a:spcAft>
-                <a:spcPts val="0"/>
-              </a:spcAft>
-              <a:buClr>
-                <a:schemeClr val="accent1"/>
-              </a:buClr>
-              <a:buSzPts val="1800"/>
-              <a:buFont typeface="Noto Sans Symbols"/>
-              <a:buChar char="▪"/>
-            </a:pPr>
-            <a:r>
-              <a:rPr lang="en-US" sz="1800">
-                <a:solidFill>
-                  <a:srgbClr val="0E0E0E"/>
-                </a:solidFill>
-                <a:latin typeface="Arial"/>
-                <a:ea typeface="Arial"/>
-                <a:cs typeface="Arial"/>
-                <a:sym typeface="Arial"/>
-              </a:rPr>
-              <a:t>When DISTINCT is applied to a column in a SELECT statement, it ensures that only unique values for that column are returned, eliminating any duplicates.</a:t>
-            </a:r>
-            <a:endParaRPr/>
-          </a:p>
-          <a:p>
-            <a:pPr marL="0" marR="0" lvl="0" indent="0" algn="l" rtl="0">
-              <a:spcBef>
-                <a:spcPts val="0"/>
-              </a:spcBef>
-              <a:spcAft>
-                <a:spcPts val="0"/>
-              </a:spcAft>
-              <a:buNone/>
-            </a:pPr>
-            <a:endParaRPr sz="1800">
-              <a:solidFill>
-                <a:srgbClr val="0E0E0E"/>
-              </a:solidFill>
-              <a:latin typeface="Arial"/>
-              <a:ea typeface="Arial"/>
-              <a:cs typeface="Arial"/>
-              <a:sym typeface="Arial"/>
-            </a:endParaRPr>
-          </a:p>
-          <a:p>
-            <a:pPr marL="0" marR="0" lvl="0" indent="0" algn="l" rtl="0">
-              <a:spcBef>
-                <a:spcPts val="0"/>
-              </a:spcBef>
-              <a:spcAft>
-                <a:spcPts val="0"/>
-              </a:spcAft>
-              <a:buNone/>
-            </a:pPr>
-            <a:r>
-              <a:rPr lang="en-US" sz="1800" b="1">
-                <a:solidFill>
-                  <a:srgbClr val="0E0E0E"/>
-                </a:solidFill>
-                <a:latin typeface="Arial"/>
-                <a:ea typeface="Arial"/>
-                <a:cs typeface="Arial"/>
-                <a:sym typeface="Arial"/>
-              </a:rPr>
-              <a:t>Syntax:</a:t>
-            </a:r>
-            <a:endParaRPr sz="1800">
-              <a:solidFill>
-                <a:srgbClr val="0E0E0E"/>
-              </a:solidFill>
-              <a:latin typeface="Arial"/>
-              <a:ea typeface="Arial"/>
-              <a:cs typeface="Arial"/>
-              <a:sym typeface="Arial"/>
-            </a:endParaRPr>
-          </a:p>
-        </p:txBody>
-      </p:sp>
-      <p:sp>
-        <p:nvSpPr>
-          <p:cNvPr id="148" name="Google Shape;148;p8"/>
-          <p:cNvSpPr txBox="1"/>
-          <p:nvPr/>
-        </p:nvSpPr>
-        <p:spPr>
-          <a:xfrm>
-            <a:off x="575894" y="3613988"/>
-            <a:ext cx="6098100" cy="646500"/>
-          </a:xfrm>
-          <a:prstGeom prst="rect">
-            <a:avLst/>
-          </a:prstGeom>
-          <a:noFill/>
-          <a:ln>
-            <a:noFill/>
-          </a:ln>
-        </p:spPr>
-        <p:txBody>
-          <a:bodyPr spcFirstLastPara="1" wrap="square" lIns="91425" tIns="45700" rIns="91425" bIns="45700" anchor="t" anchorCtr="0">
-            <a:spAutoFit/>
-          </a:bodyPr>
-          <a:lstStyle/>
-          <a:p>
-            <a:pPr marL="0" marR="0" lvl="0" indent="0" algn="l" rtl="0">
-              <a:spcBef>
-                <a:spcPts val="0"/>
-              </a:spcBef>
-              <a:spcAft>
-                <a:spcPts val="0"/>
-              </a:spcAft>
-              <a:buNone/>
-            </a:pPr>
-            <a:r>
-              <a:rPr lang="en-US" sz="1800" b="1">
-                <a:solidFill>
-                  <a:srgbClr val="800000"/>
-                </a:solidFill>
-                <a:latin typeface="Arial"/>
-                <a:ea typeface="Arial"/>
-                <a:cs typeface="Arial"/>
-                <a:sym typeface="Arial"/>
-              </a:rPr>
-              <a:t>SELECT</a:t>
-            </a:r>
-            <a:r>
-              <a:rPr lang="en-US" sz="1800">
-                <a:solidFill>
-                  <a:srgbClr val="000000"/>
-                </a:solidFill>
-                <a:latin typeface="Arial"/>
-                <a:ea typeface="Arial"/>
-                <a:cs typeface="Arial"/>
-                <a:sym typeface="Arial"/>
-              </a:rPr>
-              <a:t> </a:t>
-            </a:r>
-            <a:r>
-              <a:rPr lang="en-US" sz="1800" b="1">
-                <a:solidFill>
-                  <a:srgbClr val="800000"/>
-                </a:solidFill>
-                <a:latin typeface="Arial"/>
-                <a:ea typeface="Arial"/>
-                <a:cs typeface="Arial"/>
-                <a:sym typeface="Arial"/>
-              </a:rPr>
-              <a:t>DISTINCT</a:t>
-            </a:r>
-            <a:r>
-              <a:rPr lang="en-US" sz="1800">
-                <a:solidFill>
-                  <a:srgbClr val="000000"/>
-                </a:solidFill>
-                <a:latin typeface="Arial"/>
-                <a:ea typeface="Arial"/>
-                <a:cs typeface="Arial"/>
-                <a:sym typeface="Arial"/>
-              </a:rPr>
-              <a:t> </a:t>
-            </a:r>
-            <a:r>
-              <a:rPr lang="en-US" sz="1800" b="1" i="1" u="sng">
-                <a:solidFill>
-                  <a:srgbClr val="FF3737"/>
-                </a:solidFill>
-                <a:latin typeface="Arial"/>
-                <a:ea typeface="Arial"/>
-                <a:cs typeface="Arial"/>
-                <a:sym typeface="Arial"/>
-              </a:rPr>
-              <a:t>column1</a:t>
-            </a:r>
-            <a:r>
-              <a:rPr lang="en-US" sz="1800">
-                <a:solidFill>
-                  <a:srgbClr val="000000"/>
-                </a:solidFill>
-                <a:latin typeface="Arial"/>
-                <a:ea typeface="Arial"/>
-                <a:cs typeface="Arial"/>
-                <a:sym typeface="Arial"/>
-              </a:rPr>
-              <a:t>, </a:t>
-            </a:r>
-            <a:r>
-              <a:rPr lang="en-US" sz="1800" b="1" i="1" u="sng">
-                <a:solidFill>
-                  <a:srgbClr val="FF3737"/>
-                </a:solidFill>
-                <a:latin typeface="Arial"/>
-                <a:ea typeface="Arial"/>
-                <a:cs typeface="Arial"/>
-                <a:sym typeface="Arial"/>
-              </a:rPr>
-              <a:t>column2</a:t>
-            </a:r>
-            <a:r>
-              <a:rPr lang="en-US" sz="1800">
-                <a:solidFill>
-                  <a:srgbClr val="000000"/>
-                </a:solidFill>
-                <a:latin typeface="Arial"/>
-                <a:ea typeface="Arial"/>
-                <a:cs typeface="Arial"/>
-                <a:sym typeface="Arial"/>
-              </a:rPr>
-              <a:t>, ...</a:t>
-            </a:r>
-            <a:endParaRPr/>
-          </a:p>
-          <a:p>
-            <a:pPr marL="0" marR="0" lvl="0" indent="0" algn="l" rtl="0">
-              <a:spcBef>
-                <a:spcPts val="0"/>
-              </a:spcBef>
-              <a:spcAft>
-                <a:spcPts val="0"/>
-              </a:spcAft>
-              <a:buNone/>
-            </a:pPr>
-            <a:r>
-              <a:rPr lang="en-US" sz="1800" b="1">
-                <a:solidFill>
-                  <a:srgbClr val="800000"/>
-                </a:solidFill>
-                <a:latin typeface="Arial"/>
-                <a:ea typeface="Arial"/>
-                <a:cs typeface="Arial"/>
-                <a:sym typeface="Arial"/>
-              </a:rPr>
-              <a:t>FROM</a:t>
-            </a:r>
-            <a:r>
-              <a:rPr lang="en-US" sz="1800">
-                <a:solidFill>
-                  <a:srgbClr val="000000"/>
-                </a:solidFill>
-                <a:latin typeface="Arial"/>
-                <a:ea typeface="Arial"/>
-                <a:cs typeface="Arial"/>
-                <a:sym typeface="Arial"/>
-              </a:rPr>
-              <a:t> table_name</a:t>
-            </a:r>
-            <a:r>
-              <a:rPr lang="en-US" sz="1800">
-                <a:solidFill>
-                  <a:srgbClr val="FF0000"/>
-                </a:solidFill>
-                <a:latin typeface="Arial"/>
-                <a:ea typeface="Arial"/>
-                <a:cs typeface="Arial"/>
-                <a:sym typeface="Arial"/>
-              </a:rPr>
-              <a:t>;</a:t>
-            </a:r>
-            <a:endParaRPr sz="1800">
-              <a:solidFill>
-                <a:srgbClr val="000000"/>
-              </a:solidFill>
-              <a:latin typeface="Arial"/>
-              <a:ea typeface="Arial"/>
-              <a:cs typeface="Arial"/>
-              <a:sym typeface="Arial"/>
-            </a:endParaRPr>
-          </a:p>
-        </p:txBody>
-      </p:sp>
-      <p:sp>
-        <p:nvSpPr>
-          <p:cNvPr id="149" name="Google Shape;149;p8"/>
-          <p:cNvSpPr txBox="1"/>
-          <p:nvPr/>
-        </p:nvSpPr>
-        <p:spPr>
-          <a:xfrm>
-            <a:off x="575894" y="4445288"/>
-            <a:ext cx="6098146" cy="369332"/>
-          </a:xfrm>
-          <a:prstGeom prst="rect">
-            <a:avLst/>
-          </a:prstGeom>
-          <a:noFill/>
-          <a:ln>
-            <a:noFill/>
-          </a:ln>
-        </p:spPr>
-        <p:txBody>
-          <a:bodyPr spcFirstLastPara="1" wrap="square" lIns="91425" tIns="45700" rIns="91425" bIns="45700" anchor="t" anchorCtr="0">
-            <a:spAutoFit/>
-          </a:bodyPr>
-          <a:lstStyle/>
-          <a:p>
-            <a:pPr marL="0" marR="0" lvl="0" indent="0" algn="l" rtl="0">
-              <a:spcBef>
-                <a:spcPts val="0"/>
-              </a:spcBef>
-              <a:spcAft>
-                <a:spcPts val="0"/>
-              </a:spcAft>
-              <a:buNone/>
-            </a:pPr>
-            <a:r>
-              <a:rPr lang="en-US" sz="1800" b="1">
-                <a:solidFill>
-                  <a:srgbClr val="0E0E0E"/>
-                </a:solidFill>
-                <a:latin typeface="Arial"/>
-                <a:ea typeface="Arial"/>
-                <a:cs typeface="Arial"/>
-                <a:sym typeface="Arial"/>
-              </a:rPr>
-              <a:t>Get a list of unique customer first names:</a:t>
-            </a:r>
-            <a:endParaRPr sz="1800">
-              <a:solidFill>
-                <a:srgbClr val="0E0E0E"/>
-              </a:solidFill>
-              <a:latin typeface="Arial"/>
-              <a:ea typeface="Arial"/>
-              <a:cs typeface="Arial"/>
-              <a:sym typeface="Arial"/>
-            </a:endParaRPr>
-          </a:p>
-        </p:txBody>
-      </p:sp>
-      <p:sp>
-        <p:nvSpPr>
-          <p:cNvPr id="150" name="Google Shape;150;p8"/>
-          <p:cNvSpPr txBox="1"/>
-          <p:nvPr/>
-        </p:nvSpPr>
-        <p:spPr>
-          <a:xfrm>
-            <a:off x="575894" y="4861411"/>
-            <a:ext cx="4537019" cy="646331"/>
-          </a:xfrm>
-          <a:prstGeom prst="rect">
-            <a:avLst/>
-          </a:prstGeom>
-          <a:noFill/>
-          <a:ln>
-            <a:noFill/>
-          </a:ln>
-        </p:spPr>
-        <p:txBody>
-          <a:bodyPr spcFirstLastPara="1" wrap="square" lIns="91425" tIns="45700" rIns="91425" bIns="45700" anchor="t" anchorCtr="0">
-            <a:spAutoFit/>
-          </a:bodyPr>
-          <a:lstStyle/>
-          <a:p>
-            <a:pPr marL="0" marR="0" lvl="0" indent="0" algn="l" rtl="0">
-              <a:spcBef>
-                <a:spcPts val="0"/>
-              </a:spcBef>
-              <a:spcAft>
-                <a:spcPts val="0"/>
-              </a:spcAft>
-              <a:buNone/>
-            </a:pPr>
-            <a:r>
-              <a:rPr lang="en-US" sz="1800" b="1">
-                <a:solidFill>
-                  <a:srgbClr val="800000"/>
-                </a:solidFill>
-                <a:latin typeface="Arial"/>
-                <a:ea typeface="Arial"/>
-                <a:cs typeface="Arial"/>
-                <a:sym typeface="Arial"/>
-              </a:rPr>
-              <a:t>SELECT</a:t>
-            </a:r>
-            <a:r>
-              <a:rPr lang="en-US" sz="1800">
-                <a:solidFill>
-                  <a:srgbClr val="000000"/>
-                </a:solidFill>
-                <a:latin typeface="Arial"/>
-                <a:ea typeface="Arial"/>
-                <a:cs typeface="Arial"/>
-                <a:sym typeface="Arial"/>
-              </a:rPr>
-              <a:t> </a:t>
-            </a:r>
-            <a:r>
-              <a:rPr lang="en-US" sz="1800" b="1">
-                <a:solidFill>
-                  <a:srgbClr val="800000"/>
-                </a:solidFill>
-                <a:latin typeface="Arial"/>
-                <a:ea typeface="Arial"/>
-                <a:cs typeface="Arial"/>
-                <a:sym typeface="Arial"/>
-              </a:rPr>
-              <a:t>DISTINCT</a:t>
-            </a:r>
-            <a:r>
-              <a:rPr lang="en-US" sz="1800">
-                <a:solidFill>
-                  <a:srgbClr val="000000"/>
-                </a:solidFill>
-                <a:latin typeface="Arial"/>
-                <a:ea typeface="Arial"/>
-                <a:cs typeface="Arial"/>
-                <a:sym typeface="Arial"/>
-              </a:rPr>
-              <a:t> </a:t>
-            </a:r>
-            <a:r>
-              <a:rPr lang="en-US" sz="1800">
-                <a:solidFill>
-                  <a:srgbClr val="006464"/>
-                </a:solidFill>
-                <a:latin typeface="Arial"/>
-                <a:ea typeface="Arial"/>
-                <a:cs typeface="Arial"/>
-                <a:sym typeface="Arial"/>
-              </a:rPr>
-              <a:t>FirstName</a:t>
-            </a:r>
-            <a:endParaRPr sz="1800">
-              <a:solidFill>
-                <a:srgbClr val="000000"/>
-              </a:solidFill>
-              <a:latin typeface="Arial"/>
-              <a:ea typeface="Arial"/>
-              <a:cs typeface="Arial"/>
-              <a:sym typeface="Arial"/>
-            </a:endParaRPr>
-          </a:p>
-          <a:p>
-            <a:pPr marL="0" marR="0" lvl="0" indent="0" algn="l" rtl="0">
-              <a:spcBef>
-                <a:spcPts val="0"/>
-              </a:spcBef>
-              <a:spcAft>
-                <a:spcPts val="0"/>
-              </a:spcAft>
-              <a:buNone/>
-            </a:pPr>
-            <a:r>
-              <a:rPr lang="en-US" sz="1800" b="1">
-                <a:solidFill>
-                  <a:srgbClr val="800000"/>
-                </a:solidFill>
-                <a:latin typeface="Arial"/>
-                <a:ea typeface="Arial"/>
-                <a:cs typeface="Arial"/>
-                <a:sym typeface="Arial"/>
-              </a:rPr>
-              <a:t>FROM</a:t>
-            </a:r>
-            <a:r>
-              <a:rPr lang="en-US" sz="1800">
-                <a:solidFill>
-                  <a:srgbClr val="000000"/>
-                </a:solidFill>
-                <a:latin typeface="Arial"/>
-                <a:ea typeface="Arial"/>
-                <a:cs typeface="Arial"/>
-                <a:sym typeface="Arial"/>
-              </a:rPr>
-              <a:t> </a:t>
-            </a:r>
-            <a:r>
-              <a:rPr lang="en-US" sz="1800">
-                <a:solidFill>
-                  <a:srgbClr val="8E00C6"/>
-                </a:solidFill>
-                <a:latin typeface="Arial"/>
-                <a:ea typeface="Arial"/>
-                <a:cs typeface="Arial"/>
-                <a:sym typeface="Arial"/>
-              </a:rPr>
-              <a:t>Customer</a:t>
-            </a:r>
-            <a:r>
-              <a:rPr lang="en-US" sz="1800">
-                <a:solidFill>
-                  <a:srgbClr val="FF0000"/>
-                </a:solidFill>
-                <a:latin typeface="Arial"/>
-                <a:ea typeface="Arial"/>
-                <a:cs typeface="Arial"/>
-                <a:sym typeface="Arial"/>
-              </a:rPr>
-              <a:t>;</a:t>
-            </a:r>
-            <a:endParaRPr sz="1800">
-              <a:solidFill>
-                <a:srgbClr val="000000"/>
-              </a:solidFill>
-              <a:latin typeface="Arial"/>
-              <a:ea typeface="Arial"/>
-              <a:cs typeface="Arial"/>
-              <a:sym typeface="Arial"/>
-            </a:endParaRPr>
-          </a:p>
-        </p:txBody>
-      </p:sp>
-      <p:sp>
-        <p:nvSpPr>
-          <p:cNvPr id="151" name="Google Shape;151;p8"/>
-          <p:cNvSpPr txBox="1"/>
-          <p:nvPr/>
-        </p:nvSpPr>
-        <p:spPr>
-          <a:xfrm>
-            <a:off x="6487732" y="1397675"/>
-            <a:ext cx="3338848" cy="369332"/>
-          </a:xfrm>
-          <a:prstGeom prst="rect">
-            <a:avLst/>
-          </a:prstGeom>
-          <a:noFill/>
-          <a:ln>
-            <a:noFill/>
-          </a:ln>
-        </p:spPr>
-        <p:txBody>
-          <a:bodyPr spcFirstLastPara="1" wrap="square" lIns="91425" tIns="45700" rIns="91425" bIns="45700" anchor="t" anchorCtr="0">
-            <a:spAutoFit/>
-          </a:bodyPr>
-          <a:lstStyle/>
-          <a:p>
-            <a:pPr marL="0" marR="0" lvl="0" indent="0" algn="l" rtl="0">
-              <a:spcBef>
-                <a:spcPts val="0"/>
-              </a:spcBef>
-              <a:spcAft>
-                <a:spcPts val="0"/>
-              </a:spcAft>
-              <a:buNone/>
-            </a:pPr>
-            <a:r>
-              <a:rPr lang="en-US" sz="1800" b="1">
-                <a:solidFill>
-                  <a:srgbClr val="0E0E0E"/>
-                </a:solidFill>
-                <a:latin typeface="Arial"/>
-                <a:ea typeface="Arial"/>
-                <a:cs typeface="Arial"/>
-                <a:sym typeface="Arial"/>
-              </a:rPr>
-              <a:t>Retrieve unique invoice dates:</a:t>
-            </a:r>
-            <a:endParaRPr sz="1800">
-              <a:solidFill>
-                <a:srgbClr val="0E0E0E"/>
-              </a:solidFill>
-              <a:latin typeface="Arial"/>
-              <a:ea typeface="Arial"/>
-              <a:cs typeface="Arial"/>
-              <a:sym typeface="Arial"/>
-            </a:endParaRPr>
-          </a:p>
-        </p:txBody>
-      </p:sp>
-      <p:sp>
-        <p:nvSpPr>
-          <p:cNvPr id="152" name="Google Shape;152;p8"/>
-          <p:cNvSpPr txBox="1"/>
-          <p:nvPr/>
-        </p:nvSpPr>
-        <p:spPr>
-          <a:xfrm>
-            <a:off x="6487732" y="1932786"/>
-            <a:ext cx="5123100" cy="1200600"/>
-          </a:xfrm>
-          <a:prstGeom prst="rect">
-            <a:avLst/>
-          </a:prstGeom>
-          <a:noFill/>
-          <a:ln>
-            <a:noFill/>
-          </a:ln>
-        </p:spPr>
-        <p:txBody>
-          <a:bodyPr spcFirstLastPara="1" wrap="square" lIns="91425" tIns="45700" rIns="91425" bIns="45700" anchor="t" anchorCtr="0">
-            <a:spAutoFit/>
-          </a:bodyPr>
-          <a:lstStyle/>
-          <a:p>
-            <a:pPr marL="0" marR="0" lvl="0" indent="0" algn="l" rtl="0">
-              <a:spcBef>
-                <a:spcPts val="0"/>
-              </a:spcBef>
-              <a:spcAft>
-                <a:spcPts val="0"/>
-              </a:spcAft>
-              <a:buNone/>
-            </a:pPr>
-            <a:r>
-              <a:rPr lang="en-US" sz="1800">
-                <a:solidFill>
-                  <a:srgbClr val="0E0E0E"/>
-                </a:solidFill>
-                <a:latin typeface="Arial"/>
-                <a:ea typeface="Arial"/>
-                <a:cs typeface="Arial"/>
-                <a:sym typeface="Arial"/>
-              </a:rPr>
-              <a:t>This query fetches all the unique dates on which invoices were issued from the Invoice table. If multiple invoices were issued on the same day, the date will appear only once in the result set.</a:t>
-            </a:r>
-            <a:endParaRPr/>
-          </a:p>
-        </p:txBody>
-      </p:sp>
-      <p:sp>
-        <p:nvSpPr>
-          <p:cNvPr id="153" name="Google Shape;153;p8"/>
-          <p:cNvSpPr txBox="1"/>
-          <p:nvPr/>
-        </p:nvSpPr>
-        <p:spPr>
-          <a:xfrm>
-            <a:off x="6487732" y="3298905"/>
-            <a:ext cx="4110000" cy="646500"/>
-          </a:xfrm>
-          <a:prstGeom prst="rect">
-            <a:avLst/>
-          </a:prstGeom>
-          <a:noFill/>
-          <a:ln>
-            <a:noFill/>
-          </a:ln>
-        </p:spPr>
-        <p:txBody>
-          <a:bodyPr spcFirstLastPara="1" wrap="square" lIns="91425" tIns="45700" rIns="91425" bIns="45700" anchor="t" anchorCtr="0">
-            <a:spAutoFit/>
-          </a:bodyPr>
-          <a:lstStyle/>
-          <a:p>
-            <a:pPr marL="0" marR="0" lvl="0" indent="0" algn="l" rtl="0">
-              <a:spcBef>
-                <a:spcPts val="0"/>
-              </a:spcBef>
-              <a:spcAft>
-                <a:spcPts val="0"/>
-              </a:spcAft>
-              <a:buNone/>
-            </a:pPr>
-            <a:r>
-              <a:rPr lang="en-US" sz="1800" b="1">
-                <a:solidFill>
-                  <a:srgbClr val="800000"/>
-                </a:solidFill>
-                <a:latin typeface="Arial"/>
-                <a:ea typeface="Arial"/>
-                <a:cs typeface="Arial"/>
-                <a:sym typeface="Arial"/>
-              </a:rPr>
-              <a:t>SELECT</a:t>
-            </a:r>
-            <a:r>
-              <a:rPr lang="en-US" sz="1800">
-                <a:solidFill>
-                  <a:srgbClr val="000000"/>
-                </a:solidFill>
-                <a:latin typeface="Arial"/>
-                <a:ea typeface="Arial"/>
-                <a:cs typeface="Arial"/>
-                <a:sym typeface="Arial"/>
-              </a:rPr>
-              <a:t> </a:t>
-            </a:r>
-            <a:r>
-              <a:rPr lang="en-US" sz="1800" b="1">
-                <a:solidFill>
-                  <a:srgbClr val="800000"/>
-                </a:solidFill>
-                <a:latin typeface="Arial"/>
-                <a:ea typeface="Arial"/>
-                <a:cs typeface="Arial"/>
-                <a:sym typeface="Arial"/>
-              </a:rPr>
-              <a:t>DISTINCT</a:t>
-            </a:r>
-            <a:r>
-              <a:rPr lang="en-US" sz="1800">
-                <a:solidFill>
-                  <a:srgbClr val="000000"/>
-                </a:solidFill>
-                <a:latin typeface="Arial"/>
-                <a:ea typeface="Arial"/>
-                <a:cs typeface="Arial"/>
-                <a:sym typeface="Arial"/>
-              </a:rPr>
-              <a:t> </a:t>
-            </a:r>
-            <a:r>
-              <a:rPr lang="en-US" sz="1800">
-                <a:solidFill>
-                  <a:srgbClr val="006464"/>
-                </a:solidFill>
-                <a:latin typeface="Arial"/>
-                <a:ea typeface="Arial"/>
-                <a:cs typeface="Arial"/>
-                <a:sym typeface="Arial"/>
-              </a:rPr>
-              <a:t>InvoiceDate</a:t>
-            </a:r>
-            <a:endParaRPr sz="1800">
-              <a:solidFill>
-                <a:srgbClr val="000000"/>
-              </a:solidFill>
-              <a:latin typeface="Arial"/>
-              <a:ea typeface="Arial"/>
-              <a:cs typeface="Arial"/>
-              <a:sym typeface="Arial"/>
-            </a:endParaRPr>
-          </a:p>
-          <a:p>
-            <a:pPr marL="0" marR="0" lvl="0" indent="0" algn="l" rtl="0">
-              <a:spcBef>
-                <a:spcPts val="0"/>
-              </a:spcBef>
-              <a:spcAft>
-                <a:spcPts val="0"/>
-              </a:spcAft>
-              <a:buNone/>
-            </a:pPr>
-            <a:r>
-              <a:rPr lang="en-US" sz="1800" b="1">
-                <a:solidFill>
-                  <a:srgbClr val="800000"/>
-                </a:solidFill>
-                <a:latin typeface="Arial"/>
-                <a:ea typeface="Arial"/>
-                <a:cs typeface="Arial"/>
-                <a:sym typeface="Arial"/>
-              </a:rPr>
-              <a:t>FROM</a:t>
-            </a:r>
-            <a:r>
-              <a:rPr lang="en-US" sz="1800">
-                <a:solidFill>
-                  <a:srgbClr val="000000"/>
-                </a:solidFill>
-                <a:latin typeface="Arial"/>
-                <a:ea typeface="Arial"/>
-                <a:cs typeface="Arial"/>
-                <a:sym typeface="Arial"/>
-              </a:rPr>
-              <a:t> </a:t>
-            </a:r>
-            <a:r>
-              <a:rPr lang="en-US" sz="1800">
-                <a:solidFill>
-                  <a:srgbClr val="8E00C6"/>
-                </a:solidFill>
-                <a:latin typeface="Arial"/>
-                <a:ea typeface="Arial"/>
-                <a:cs typeface="Arial"/>
-                <a:sym typeface="Arial"/>
-              </a:rPr>
-              <a:t>Invoice</a:t>
-            </a:r>
-            <a:r>
-              <a:rPr lang="en-US" sz="1800">
-                <a:solidFill>
-                  <a:srgbClr val="FF0000"/>
-                </a:solidFill>
-                <a:latin typeface="Arial"/>
-                <a:ea typeface="Arial"/>
-                <a:cs typeface="Arial"/>
-                <a:sym typeface="Arial"/>
-              </a:rPr>
-              <a:t>;</a:t>
-            </a:r>
-            <a:endParaRPr sz="1800">
-              <a:solidFill>
-                <a:srgbClr val="000000"/>
-              </a:solidFill>
-              <a:latin typeface="Arial"/>
-              <a:ea typeface="Arial"/>
-              <a:cs typeface="Arial"/>
-              <a:sym typeface="Arial"/>
-            </a:endParaRPr>
-          </a:p>
-        </p:txBody>
-      </p:sp>
-      <p:sp>
-        <p:nvSpPr>
-          <p:cNvPr id="154" name="Google Shape;154;p8"/>
-          <p:cNvSpPr txBox="1"/>
-          <p:nvPr/>
-        </p:nvSpPr>
-        <p:spPr>
-          <a:xfrm>
-            <a:off x="6487732" y="4030181"/>
-            <a:ext cx="4617000" cy="2308800"/>
-          </a:xfrm>
-          <a:prstGeom prst="rect">
-            <a:avLst/>
-          </a:prstGeom>
-          <a:noFill/>
-          <a:ln>
-            <a:noFill/>
-          </a:ln>
-        </p:spPr>
-        <p:txBody>
-          <a:bodyPr spcFirstLastPara="1" wrap="square" lIns="91425" tIns="45700" rIns="91425" bIns="45700" anchor="t" anchorCtr="0">
-            <a:spAutoFit/>
-          </a:bodyPr>
-          <a:lstStyle/>
-          <a:p>
-            <a:pPr marL="0" marR="0" lvl="0" indent="0" algn="l" rtl="0">
-              <a:spcBef>
-                <a:spcPts val="0"/>
-              </a:spcBef>
-              <a:spcAft>
-                <a:spcPts val="0"/>
-              </a:spcAft>
-              <a:buNone/>
-            </a:pPr>
-            <a:r>
-              <a:rPr lang="en-US" sz="1800" b="1">
-                <a:solidFill>
-                  <a:srgbClr val="0E0E0E"/>
-                </a:solidFill>
-                <a:latin typeface="Arial"/>
-                <a:ea typeface="Arial"/>
-                <a:cs typeface="Arial"/>
-                <a:sym typeface="Arial"/>
-              </a:rPr>
-              <a:t>When to Use DISTINCT:</a:t>
-            </a:r>
-            <a:endParaRPr sz="1800">
-              <a:solidFill>
-                <a:srgbClr val="0E0E0E"/>
-              </a:solidFill>
-              <a:latin typeface="Arial"/>
-              <a:ea typeface="Arial"/>
-              <a:cs typeface="Arial"/>
-              <a:sym typeface="Arial"/>
-            </a:endParaRPr>
-          </a:p>
-          <a:p>
-            <a:pPr marL="0" marR="0" lvl="0" indent="0" algn="l" rtl="0">
-              <a:spcBef>
-                <a:spcPts val="0"/>
-              </a:spcBef>
-              <a:spcAft>
-                <a:spcPts val="0"/>
-              </a:spcAft>
-              <a:buNone/>
-            </a:pPr>
-            <a:endParaRPr sz="1800">
-              <a:solidFill>
-                <a:srgbClr val="0E0E0E"/>
-              </a:solidFill>
-              <a:latin typeface="Arial"/>
-              <a:ea typeface="Arial"/>
-              <a:cs typeface="Arial"/>
-              <a:sym typeface="Arial"/>
-            </a:endParaRPr>
-          </a:p>
-          <a:p>
-            <a:pPr marL="0" marR="0" lvl="0" indent="0" algn="l" rtl="0">
-              <a:spcBef>
-                <a:spcPts val="0"/>
-              </a:spcBef>
-              <a:spcAft>
-                <a:spcPts val="0"/>
-              </a:spcAft>
-              <a:buNone/>
-            </a:pPr>
-            <a:r>
-              <a:rPr lang="en-US" sz="1800">
-                <a:solidFill>
-                  <a:srgbClr val="0E0E0E"/>
-                </a:solidFill>
-                <a:latin typeface="Arial"/>
-                <a:ea typeface="Arial"/>
-                <a:cs typeface="Arial"/>
-                <a:sym typeface="Arial"/>
-              </a:rPr>
-              <a:t>• </a:t>
-            </a:r>
-            <a:r>
-              <a:rPr lang="en-US" sz="1800" b="1">
-                <a:solidFill>
-                  <a:srgbClr val="0E0E0E"/>
-                </a:solidFill>
-                <a:latin typeface="Arial"/>
-                <a:ea typeface="Arial"/>
-                <a:cs typeface="Arial"/>
-                <a:sym typeface="Arial"/>
-              </a:rPr>
-              <a:t>To eliminate duplicates</a:t>
-            </a:r>
-            <a:r>
-              <a:rPr lang="en-US" sz="1800">
-                <a:solidFill>
-                  <a:srgbClr val="0E0E0E"/>
-                </a:solidFill>
-                <a:latin typeface="Arial"/>
-                <a:ea typeface="Arial"/>
-                <a:cs typeface="Arial"/>
-                <a:sym typeface="Arial"/>
-              </a:rPr>
-              <a:t> from your result set when you’re only interested in unique values.</a:t>
-            </a:r>
-            <a:endParaRPr/>
-          </a:p>
-          <a:p>
-            <a:pPr marL="0" marR="0" lvl="0" indent="0" algn="l" rtl="0">
-              <a:spcBef>
-                <a:spcPts val="0"/>
-              </a:spcBef>
-              <a:spcAft>
-                <a:spcPts val="0"/>
-              </a:spcAft>
-              <a:buNone/>
-            </a:pPr>
-            <a:r>
-              <a:rPr lang="en-US" sz="1800">
-                <a:solidFill>
-                  <a:srgbClr val="0E0E0E"/>
-                </a:solidFill>
-                <a:latin typeface="Arial"/>
-                <a:ea typeface="Arial"/>
-                <a:cs typeface="Arial"/>
-                <a:sym typeface="Arial"/>
-              </a:rPr>
-              <a:t>• </a:t>
-            </a:r>
-            <a:r>
-              <a:rPr lang="en-US" sz="1800" b="1">
-                <a:solidFill>
-                  <a:srgbClr val="0E0E0E"/>
-                </a:solidFill>
-                <a:latin typeface="Arial"/>
-                <a:ea typeface="Arial"/>
-                <a:cs typeface="Arial"/>
-                <a:sym typeface="Arial"/>
-              </a:rPr>
-              <a:t>On columns with repeating values</a:t>
-            </a:r>
-            <a:r>
-              <a:rPr lang="en-US" sz="1800">
-                <a:solidFill>
-                  <a:srgbClr val="0E0E0E"/>
-                </a:solidFill>
-                <a:latin typeface="Arial"/>
-                <a:ea typeface="Arial"/>
-                <a:cs typeface="Arial"/>
-                <a:sym typeface="Arial"/>
-              </a:rPr>
-              <a:t>, where you want to count or list only unique occurrences.</a:t>
-            </a:r>
-            <a:endParaRPr/>
-          </a:p>
-        </p:txBody>
-      </p:sp>
-    </p:spTree>
-  </p:cSld>
-  <p:clrMapOvr>
-    <a:masterClrMapping/>
-  </p:clrMapOvr>
-</p:sld>
-</file>
-
-<file path=ppt/slides/slide4.xml><?xml version="1.0" encoding="utf-8"?>
-<p:sld xmlns:a="http://schemas.openxmlformats.org/drawingml/2006/main" xmlns:r="http://schemas.openxmlformats.org/officeDocument/2006/relationships" xmlns:p="http://schemas.openxmlformats.org/presentationml/2006/main">
-  <p:cSld>
-    <p:spTree>
-      <p:nvGrpSpPr>
         <p:cNvPr id="1" name="Shape 158"/>
         <p:cNvGrpSpPr/>
         <p:nvPr/>
@@ -21880,7 +19919,7 @@
 </p:sld>
 </file>
 
-<file path=ppt/slides/slide5.xml><?xml version="1.0" encoding="utf-8"?>
+<file path=ppt/slides/slide4.xml><?xml version="1.0" encoding="utf-8"?>
 <p:sld xmlns:a="http://schemas.openxmlformats.org/drawingml/2006/main" xmlns:r="http://schemas.openxmlformats.org/officeDocument/2006/relationships" xmlns:p="http://schemas.openxmlformats.org/presentationml/2006/main">
   <p:cSld>
     <p:spTree>
@@ -21986,7 +20025,7 @@
 </p:sld>
 </file>
 
-<file path=ppt/slides/slide6.xml><?xml version="1.0" encoding="utf-8"?>
+<file path=ppt/slides/slide5.xml><?xml version="1.0" encoding="utf-8"?>
 <p:sld xmlns:a="http://schemas.openxmlformats.org/drawingml/2006/main" xmlns:r="http://schemas.openxmlformats.org/officeDocument/2006/relationships" xmlns:p="http://schemas.openxmlformats.org/presentationml/2006/main">
   <p:cSld>
     <p:spTree>
@@ -22097,7 +20136,7 @@
             </a:pPr>
             <a:fld id="{00000000-1234-1234-1234-123412341234}" type="slidenum">
               <a:rPr lang="en-US"/>
-              <a:t>6</a:t>
+              <a:t>5</a:t>
             </a:fld>
             <a:endParaRPr/>
           </a:p>
@@ -22627,7 +20666,7 @@
 </p:sld>
 </file>
 
-<file path=ppt/slides/slide7.xml><?xml version="1.0" encoding="utf-8"?>
+<file path=ppt/slides/slide6.xml><?xml version="1.0" encoding="utf-8"?>
 <p:sld xmlns:a="http://schemas.openxmlformats.org/drawingml/2006/main" xmlns:r="http://schemas.openxmlformats.org/officeDocument/2006/relationships" xmlns:p="http://schemas.openxmlformats.org/presentationml/2006/main">
   <p:cSld>
     <p:spTree>
@@ -22733,7 +20772,7 @@
 </p:sld>
 </file>
 
-<file path=ppt/slides/slide8.xml><?xml version="1.0" encoding="utf-8"?>
+<file path=ppt/slides/slide7.xml><?xml version="1.0" encoding="utf-8"?>
 <p:sld xmlns:a="http://schemas.openxmlformats.org/drawingml/2006/main" xmlns:r="http://schemas.openxmlformats.org/officeDocument/2006/relationships" xmlns:p="http://schemas.openxmlformats.org/presentationml/2006/main">
   <p:cSld>
     <p:spTree>
@@ -22844,7 +20883,7 @@
             </a:pPr>
             <a:fld id="{00000000-1234-1234-1234-123412341234}" type="slidenum">
               <a:rPr lang="en-US"/>
-              <a:t>8</a:t>
+              <a:t>7</a:t>
             </a:fld>
             <a:endParaRPr/>
           </a:p>
@@ -23650,7 +21689,7 @@
 </p:sld>
 </file>
 
-<file path=ppt/slides/slide9.xml><?xml version="1.0" encoding="utf-8"?>
+<file path=ppt/slides/slide8.xml><?xml version="1.0" encoding="utf-8"?>
 <p:sld xmlns:a="http://schemas.openxmlformats.org/drawingml/2006/main" xmlns:r="http://schemas.openxmlformats.org/officeDocument/2006/relationships" xmlns:p="http://schemas.openxmlformats.org/presentationml/2006/main">
   <p:cSld>
     <p:spTree>
@@ -23761,7 +21800,7 @@
             </a:pPr>
             <a:fld id="{00000000-1234-1234-1234-123412341234}" type="slidenum">
               <a:rPr lang="en-US"/>
-              <a:t>9</a:t>
+              <a:t>8</a:t>
             </a:fld>
             <a:endParaRPr/>
           </a:p>
@@ -24848,6 +22887,723 @@
                 <a:sym typeface="Arial"/>
               </a:rPr>
               <a:t>: This query extracts the first 3 characters from the FirstName of each customer, which can be useful for generating a prefix or performing partial matches.</a:t>
+            </a:r>
+            <a:endParaRPr/>
+          </a:p>
+        </p:txBody>
+      </p:sp>
+    </p:spTree>
+  </p:cSld>
+  <p:clrMapOvr>
+    <a:masterClrMapping/>
+  </p:clrMapOvr>
+</p:sld>
+</file>
+
+<file path=ppt/slides/slide9.xml><?xml version="1.0" encoding="utf-8"?>
+<p:sld xmlns:a="http://schemas.openxmlformats.org/drawingml/2006/main" xmlns:r="http://schemas.openxmlformats.org/officeDocument/2006/relationships" xmlns:p="http://schemas.openxmlformats.org/presentationml/2006/main">
+  <p:cSld>
+    <p:spTree>
+      <p:nvGrpSpPr>
+        <p:cNvPr id="1" name="Shape 219"/>
+        <p:cNvGrpSpPr/>
+        <p:nvPr/>
+      </p:nvGrpSpPr>
+      <p:grpSpPr>
+        <a:xfrm>
+          <a:off x="0" y="0"/>
+          <a:ext cx="0" cy="0"/>
+          <a:chOff x="0" y="0"/>
+          <a:chExt cx="0" cy="0"/>
+        </a:xfrm>
+      </p:grpSpPr>
+      <p:sp>
+        <p:nvSpPr>
+          <p:cNvPr id="220" name="Google Shape;220;p16"/>
+          <p:cNvSpPr txBox="1">
+            <a:spLocks noGrp="1"/>
+          </p:cNvSpPr>
+          <p:nvPr>
+            <p:ph type="title"/>
+          </p:nvPr>
+        </p:nvSpPr>
+        <p:spPr>
+          <a:xfrm>
+            <a:off x="575894" y="729658"/>
+            <a:ext cx="11029616" cy="612445"/>
+          </a:xfrm>
+          <a:prstGeom prst="rect">
+            <a:avLst/>
+          </a:prstGeom>
+          <a:noFill/>
+          <a:ln>
+            <a:noFill/>
+          </a:ln>
+        </p:spPr>
+        <p:txBody>
+          <a:bodyPr spcFirstLastPara="1" wrap="square" lIns="91425" tIns="45700" rIns="91425" bIns="45700" anchor="b" anchorCtr="0">
+            <a:normAutofit/>
+          </a:bodyPr>
+          <a:lstStyle/>
+          <a:p>
+            <a:pPr marL="0" lvl="0" indent="0" algn="l" rtl="0">
+              <a:lnSpc>
+                <a:spcPct val="100000"/>
+              </a:lnSpc>
+              <a:spcBef>
+                <a:spcPts val="0"/>
+              </a:spcBef>
+              <a:spcAft>
+                <a:spcPts val="0"/>
+              </a:spcAft>
+              <a:buClr>
+                <a:srgbClr val="3F3F3F"/>
+              </a:buClr>
+              <a:buSzPts val="2800"/>
+              <a:buFont typeface="Franklin Gothic"/>
+              <a:buNone/>
+            </a:pPr>
+            <a:r>
+              <a:rPr lang="en-US"/>
+              <a:t>COMBINING STRING FUNCTIONS</a:t>
+            </a:r>
+            <a:endParaRPr/>
+          </a:p>
+        </p:txBody>
+      </p:sp>
+      <p:sp>
+        <p:nvSpPr>
+          <p:cNvPr id="221" name="Google Shape;221;p16"/>
+          <p:cNvSpPr txBox="1">
+            <a:spLocks noGrp="1"/>
+          </p:cNvSpPr>
+          <p:nvPr>
+            <p:ph type="sldNum" idx="12"/>
+          </p:nvPr>
+        </p:nvSpPr>
+        <p:spPr>
+          <a:xfrm>
+            <a:off x="10558300" y="6423914"/>
+            <a:ext cx="1052510" cy="365125"/>
+          </a:xfrm>
+          <a:prstGeom prst="rect">
+            <a:avLst/>
+          </a:prstGeom>
+          <a:noFill/>
+          <a:ln>
+            <a:noFill/>
+          </a:ln>
+        </p:spPr>
+        <p:txBody>
+          <a:bodyPr spcFirstLastPara="1" wrap="square" lIns="91425" tIns="45700" rIns="91425" bIns="45700" anchor="ctr" anchorCtr="0">
+            <a:noAutofit/>
+          </a:bodyPr>
+          <a:lstStyle/>
+          <a:p>
+            <a:pPr marL="0" lvl="0" indent="0" algn="r" rtl="0">
+              <a:spcBef>
+                <a:spcPts val="0"/>
+              </a:spcBef>
+              <a:spcAft>
+                <a:spcPts val="0"/>
+              </a:spcAft>
+              <a:buNone/>
+            </a:pPr>
+            <a:fld id="{00000000-1234-1234-1234-123412341234}" type="slidenum">
+              <a:rPr lang="en-US"/>
+              <a:t>9</a:t>
+            </a:fld>
+            <a:endParaRPr/>
+          </a:p>
+        </p:txBody>
+      </p:sp>
+      <p:sp>
+        <p:nvSpPr>
+          <p:cNvPr id="222" name="Google Shape;222;p16"/>
+          <p:cNvSpPr txBox="1"/>
+          <p:nvPr/>
+        </p:nvSpPr>
+        <p:spPr>
+          <a:xfrm>
+            <a:off x="615750" y="1800341"/>
+            <a:ext cx="5386849" cy="1631216"/>
+          </a:xfrm>
+          <a:prstGeom prst="rect">
+            <a:avLst/>
+          </a:prstGeom>
+          <a:noFill/>
+          <a:ln>
+            <a:noFill/>
+          </a:ln>
+        </p:spPr>
+        <p:txBody>
+          <a:bodyPr spcFirstLastPara="1" wrap="square" lIns="91425" tIns="45700" rIns="91425" bIns="45700" anchor="t" anchorCtr="0">
+            <a:spAutoFit/>
+          </a:bodyPr>
+          <a:lstStyle/>
+          <a:p>
+            <a:pPr marL="0" marR="0" lvl="0" indent="0" algn="l" rtl="0">
+              <a:spcBef>
+                <a:spcPts val="0"/>
+              </a:spcBef>
+              <a:spcAft>
+                <a:spcPts val="0"/>
+              </a:spcAft>
+              <a:buNone/>
+            </a:pPr>
+            <a:r>
+              <a:rPr lang="en-US" sz="2000">
+                <a:solidFill>
+                  <a:srgbClr val="0E0E0E"/>
+                </a:solidFill>
+                <a:latin typeface="Arial"/>
+                <a:ea typeface="Arial"/>
+                <a:cs typeface="Arial"/>
+                <a:sym typeface="Arial"/>
+              </a:rPr>
+              <a:t>You can also combine these functions for more complex string manipulations.</a:t>
+            </a:r>
+            <a:endParaRPr/>
+          </a:p>
+          <a:p>
+            <a:pPr marL="0" marR="0" lvl="0" indent="0" algn="l" rtl="0">
+              <a:spcBef>
+                <a:spcPts val="0"/>
+              </a:spcBef>
+              <a:spcAft>
+                <a:spcPts val="0"/>
+              </a:spcAft>
+              <a:buNone/>
+            </a:pPr>
+            <a:endParaRPr sz="2000">
+              <a:solidFill>
+                <a:srgbClr val="0E0E0E"/>
+              </a:solidFill>
+              <a:latin typeface="Arial"/>
+              <a:ea typeface="Arial"/>
+              <a:cs typeface="Arial"/>
+              <a:sym typeface="Arial"/>
+            </a:endParaRPr>
+          </a:p>
+          <a:p>
+            <a:pPr marL="0" marR="0" lvl="0" indent="0" algn="l" rtl="0">
+              <a:spcBef>
+                <a:spcPts val="0"/>
+              </a:spcBef>
+              <a:spcAft>
+                <a:spcPts val="0"/>
+              </a:spcAft>
+              <a:buNone/>
+            </a:pPr>
+            <a:r>
+              <a:rPr lang="en-US" sz="2000" b="1">
+                <a:solidFill>
+                  <a:srgbClr val="0E0E0E"/>
+                </a:solidFill>
+                <a:latin typeface="Arial"/>
+                <a:ea typeface="Arial"/>
+                <a:cs typeface="Arial"/>
+                <a:sym typeface="Arial"/>
+              </a:rPr>
+              <a:t>Example: Concatenating a cleaned full name and lowercased email address</a:t>
+            </a:r>
+            <a:endParaRPr sz="2000">
+              <a:solidFill>
+                <a:srgbClr val="0E0E0E"/>
+              </a:solidFill>
+              <a:latin typeface="Arial"/>
+              <a:ea typeface="Arial"/>
+              <a:cs typeface="Arial"/>
+              <a:sym typeface="Arial"/>
+            </a:endParaRPr>
+          </a:p>
+        </p:txBody>
+      </p:sp>
+      <p:sp>
+        <p:nvSpPr>
+          <p:cNvPr id="223" name="Google Shape;223;p16"/>
+          <p:cNvSpPr txBox="1"/>
+          <p:nvPr/>
+        </p:nvSpPr>
+        <p:spPr>
+          <a:xfrm>
+            <a:off x="727501" y="3669494"/>
+            <a:ext cx="9124422" cy="1200329"/>
+          </a:xfrm>
+          <a:prstGeom prst="rect">
+            <a:avLst/>
+          </a:prstGeom>
+          <a:solidFill>
+            <a:srgbClr val="F2F2F2"/>
+          </a:solidFill>
+          <a:ln>
+            <a:noFill/>
+          </a:ln>
+        </p:spPr>
+        <p:txBody>
+          <a:bodyPr spcFirstLastPara="1" wrap="square" lIns="91425" tIns="45700" rIns="91425" bIns="45700" anchor="t" anchorCtr="0">
+            <a:spAutoFit/>
+          </a:bodyPr>
+          <a:lstStyle/>
+          <a:p>
+            <a:pPr marL="0" marR="0" lvl="0" indent="0" algn="l" rtl="0">
+              <a:spcBef>
+                <a:spcPts val="0"/>
+              </a:spcBef>
+              <a:spcAft>
+                <a:spcPts val="0"/>
+              </a:spcAft>
+              <a:buNone/>
+            </a:pPr>
+            <a:r>
+              <a:rPr lang="en-US" sz="1800" b="1">
+                <a:solidFill>
+                  <a:srgbClr val="800000"/>
+                </a:solidFill>
+                <a:latin typeface="Arial"/>
+                <a:ea typeface="Arial"/>
+                <a:cs typeface="Arial"/>
+                <a:sym typeface="Arial"/>
+              </a:rPr>
+              <a:t>SELECT</a:t>
+            </a:r>
+            <a:r>
+              <a:rPr lang="en-US" sz="1800">
+                <a:solidFill>
+                  <a:srgbClr val="000000"/>
+                </a:solidFill>
+                <a:latin typeface="Arial"/>
+                <a:ea typeface="Arial"/>
+                <a:cs typeface="Arial"/>
+                <a:sym typeface="Arial"/>
+              </a:rPr>
+              <a:t> </a:t>
+            </a:r>
+            <a:r>
+              <a:rPr lang="en-US" sz="1800">
+                <a:solidFill>
+                  <a:srgbClr val="006464"/>
+                </a:solidFill>
+                <a:latin typeface="Arial"/>
+                <a:ea typeface="Arial"/>
+                <a:cs typeface="Arial"/>
+                <a:sym typeface="Arial"/>
+              </a:rPr>
+              <a:t>CustomerID</a:t>
+            </a:r>
+            <a:r>
+              <a:rPr lang="en-US" sz="1800">
+                <a:solidFill>
+                  <a:srgbClr val="000000"/>
+                </a:solidFill>
+                <a:latin typeface="Arial"/>
+                <a:ea typeface="Arial"/>
+                <a:cs typeface="Arial"/>
+                <a:sym typeface="Arial"/>
+              </a:rPr>
+              <a:t>, CONCAT(</a:t>
+            </a:r>
+            <a:r>
+              <a:rPr lang="en-US" sz="1800" b="1">
+                <a:solidFill>
+                  <a:srgbClr val="000080"/>
+                </a:solidFill>
+                <a:latin typeface="Arial"/>
+                <a:ea typeface="Arial"/>
+                <a:cs typeface="Arial"/>
+                <a:sym typeface="Arial"/>
+              </a:rPr>
+              <a:t>TRIM</a:t>
+            </a:r>
+            <a:r>
+              <a:rPr lang="en-US" sz="1800">
+                <a:solidFill>
+                  <a:srgbClr val="000000"/>
+                </a:solidFill>
+                <a:latin typeface="Arial"/>
+                <a:ea typeface="Arial"/>
+                <a:cs typeface="Arial"/>
+                <a:sym typeface="Arial"/>
+              </a:rPr>
+              <a:t>(</a:t>
+            </a:r>
+            <a:r>
+              <a:rPr lang="en-US" sz="1800" b="1" i="1" u="sng">
+                <a:solidFill>
+                  <a:srgbClr val="FF3737"/>
+                </a:solidFill>
+                <a:latin typeface="Arial"/>
+                <a:ea typeface="Arial"/>
+                <a:cs typeface="Arial"/>
+                <a:sym typeface="Arial"/>
+              </a:rPr>
+              <a:t>FirstName</a:t>
+            </a:r>
+            <a:r>
+              <a:rPr lang="en-US" sz="1800">
+                <a:solidFill>
+                  <a:srgbClr val="000000"/>
+                </a:solidFill>
+                <a:latin typeface="Arial"/>
+                <a:ea typeface="Arial"/>
+                <a:cs typeface="Arial"/>
+                <a:sym typeface="Arial"/>
+              </a:rPr>
+              <a:t>), </a:t>
+            </a:r>
+            <a:r>
+              <a:rPr lang="en-US" sz="1800" b="1">
+                <a:solidFill>
+                  <a:srgbClr val="008000"/>
+                </a:solidFill>
+                <a:latin typeface="Arial"/>
+                <a:ea typeface="Arial"/>
+                <a:cs typeface="Arial"/>
+                <a:sym typeface="Arial"/>
+              </a:rPr>
+              <a:t>' '</a:t>
+            </a:r>
+            <a:r>
+              <a:rPr lang="en-US" sz="1800">
+                <a:solidFill>
+                  <a:srgbClr val="000000"/>
+                </a:solidFill>
+                <a:latin typeface="Arial"/>
+                <a:ea typeface="Arial"/>
+                <a:cs typeface="Arial"/>
+                <a:sym typeface="Arial"/>
+              </a:rPr>
+              <a:t>, </a:t>
+            </a:r>
+            <a:r>
+              <a:rPr lang="en-US" sz="1800" b="1">
+                <a:solidFill>
+                  <a:srgbClr val="000080"/>
+                </a:solidFill>
+                <a:latin typeface="Arial"/>
+                <a:ea typeface="Arial"/>
+                <a:cs typeface="Arial"/>
+                <a:sym typeface="Arial"/>
+              </a:rPr>
+              <a:t>TRIM</a:t>
+            </a:r>
+            <a:r>
+              <a:rPr lang="en-US" sz="1800">
+                <a:solidFill>
+                  <a:srgbClr val="000000"/>
+                </a:solidFill>
+                <a:latin typeface="Arial"/>
+                <a:ea typeface="Arial"/>
+                <a:cs typeface="Arial"/>
+                <a:sym typeface="Arial"/>
+              </a:rPr>
+              <a:t>(</a:t>
+            </a:r>
+            <a:r>
+              <a:rPr lang="en-US" sz="1800" b="1" i="1" u="sng">
+                <a:solidFill>
+                  <a:srgbClr val="FF3737"/>
+                </a:solidFill>
+                <a:latin typeface="Arial"/>
+                <a:ea typeface="Arial"/>
+                <a:cs typeface="Arial"/>
+                <a:sym typeface="Arial"/>
+              </a:rPr>
+              <a:t>LastName</a:t>
+            </a:r>
+            <a:r>
+              <a:rPr lang="en-US" sz="1800">
+                <a:solidFill>
+                  <a:srgbClr val="000000"/>
+                </a:solidFill>
+                <a:latin typeface="Arial"/>
+                <a:ea typeface="Arial"/>
+                <a:cs typeface="Arial"/>
+                <a:sym typeface="Arial"/>
+              </a:rPr>
+              <a:t>)) </a:t>
+            </a:r>
+            <a:r>
+              <a:rPr lang="en-US" sz="1800" b="1">
+                <a:solidFill>
+                  <a:srgbClr val="800000"/>
+                </a:solidFill>
+                <a:latin typeface="Arial"/>
+                <a:ea typeface="Arial"/>
+                <a:cs typeface="Arial"/>
+                <a:sym typeface="Arial"/>
+              </a:rPr>
+              <a:t>AS</a:t>
+            </a:r>
+            <a:r>
+              <a:rPr lang="en-US" sz="1800">
+                <a:solidFill>
+                  <a:srgbClr val="000000"/>
+                </a:solidFill>
+                <a:latin typeface="Arial"/>
+                <a:ea typeface="Arial"/>
+                <a:cs typeface="Arial"/>
+                <a:sym typeface="Arial"/>
+              </a:rPr>
+              <a:t> </a:t>
+            </a:r>
+            <a:r>
+              <a:rPr lang="en-US" sz="1800" i="1">
+                <a:solidFill>
+                  <a:srgbClr val="006464"/>
+                </a:solidFill>
+                <a:latin typeface="Arial"/>
+                <a:ea typeface="Arial"/>
+                <a:cs typeface="Arial"/>
+                <a:sym typeface="Arial"/>
+              </a:rPr>
+              <a:t>FullName</a:t>
+            </a:r>
+            <a:r>
+              <a:rPr lang="en-US" sz="1800">
+                <a:solidFill>
+                  <a:srgbClr val="000000"/>
+                </a:solidFill>
+                <a:latin typeface="Arial"/>
+                <a:ea typeface="Arial"/>
+                <a:cs typeface="Arial"/>
+                <a:sym typeface="Arial"/>
+              </a:rPr>
+              <a:t>, </a:t>
+            </a:r>
+            <a:endParaRPr/>
+          </a:p>
+          <a:p>
+            <a:pPr marL="0" marR="0" lvl="0" indent="0" algn="l" rtl="0">
+              <a:spcBef>
+                <a:spcPts val="0"/>
+              </a:spcBef>
+              <a:spcAft>
+                <a:spcPts val="0"/>
+              </a:spcAft>
+              <a:buNone/>
+            </a:pPr>
+            <a:r>
+              <a:rPr lang="en-US" sz="1800" b="1">
+                <a:solidFill>
+                  <a:srgbClr val="000080"/>
+                </a:solidFill>
+                <a:latin typeface="Arial"/>
+                <a:ea typeface="Arial"/>
+                <a:cs typeface="Arial"/>
+                <a:sym typeface="Arial"/>
+              </a:rPr>
+              <a:t>LOWER</a:t>
+            </a:r>
+            <a:r>
+              <a:rPr lang="en-US" sz="1800">
+                <a:solidFill>
+                  <a:srgbClr val="000000"/>
+                </a:solidFill>
+                <a:latin typeface="Arial"/>
+                <a:ea typeface="Arial"/>
+                <a:cs typeface="Arial"/>
+                <a:sym typeface="Arial"/>
+              </a:rPr>
+              <a:t>(</a:t>
+            </a:r>
+            <a:r>
+              <a:rPr lang="en-US" sz="1800" b="1" i="1" u="sng">
+                <a:solidFill>
+                  <a:srgbClr val="FF3737"/>
+                </a:solidFill>
+                <a:latin typeface="Arial"/>
+                <a:ea typeface="Arial"/>
+                <a:cs typeface="Arial"/>
+                <a:sym typeface="Arial"/>
+              </a:rPr>
+              <a:t>Email</a:t>
+            </a:r>
+            <a:r>
+              <a:rPr lang="en-US" sz="1800">
+                <a:solidFill>
+                  <a:srgbClr val="000000"/>
+                </a:solidFill>
+                <a:latin typeface="Arial"/>
+                <a:ea typeface="Arial"/>
+                <a:cs typeface="Arial"/>
+                <a:sym typeface="Arial"/>
+              </a:rPr>
+              <a:t>) </a:t>
+            </a:r>
+            <a:r>
+              <a:rPr lang="en-US" sz="1800" b="1">
+                <a:solidFill>
+                  <a:srgbClr val="800000"/>
+                </a:solidFill>
+                <a:latin typeface="Arial"/>
+                <a:ea typeface="Arial"/>
+                <a:cs typeface="Arial"/>
+                <a:sym typeface="Arial"/>
+              </a:rPr>
+              <a:t>AS</a:t>
+            </a:r>
+            <a:r>
+              <a:rPr lang="en-US" sz="1800">
+                <a:solidFill>
+                  <a:srgbClr val="000000"/>
+                </a:solidFill>
+                <a:latin typeface="Arial"/>
+                <a:ea typeface="Arial"/>
+                <a:cs typeface="Arial"/>
+                <a:sym typeface="Arial"/>
+              </a:rPr>
+              <a:t> </a:t>
+            </a:r>
+            <a:r>
+              <a:rPr lang="en-US" sz="1800" i="1">
+                <a:solidFill>
+                  <a:srgbClr val="006464"/>
+                </a:solidFill>
+                <a:latin typeface="Arial"/>
+                <a:ea typeface="Arial"/>
+                <a:cs typeface="Arial"/>
+                <a:sym typeface="Arial"/>
+              </a:rPr>
+              <a:t>LowercaseEmail</a:t>
+            </a:r>
+            <a:endParaRPr sz="1800">
+              <a:solidFill>
+                <a:srgbClr val="000000"/>
+              </a:solidFill>
+              <a:latin typeface="Arial"/>
+              <a:ea typeface="Arial"/>
+              <a:cs typeface="Arial"/>
+              <a:sym typeface="Arial"/>
+            </a:endParaRPr>
+          </a:p>
+          <a:p>
+            <a:pPr marL="0" marR="0" lvl="0" indent="0" algn="l" rtl="0">
+              <a:spcBef>
+                <a:spcPts val="0"/>
+              </a:spcBef>
+              <a:spcAft>
+                <a:spcPts val="0"/>
+              </a:spcAft>
+              <a:buNone/>
+            </a:pPr>
+            <a:r>
+              <a:rPr lang="en-US" sz="1800" b="1">
+                <a:solidFill>
+                  <a:srgbClr val="800000"/>
+                </a:solidFill>
+                <a:latin typeface="Arial"/>
+                <a:ea typeface="Arial"/>
+                <a:cs typeface="Arial"/>
+                <a:sym typeface="Arial"/>
+              </a:rPr>
+              <a:t>FROM</a:t>
+            </a:r>
+            <a:r>
+              <a:rPr lang="en-US" sz="1800">
+                <a:solidFill>
+                  <a:srgbClr val="000000"/>
+                </a:solidFill>
+                <a:latin typeface="Arial"/>
+                <a:ea typeface="Arial"/>
+                <a:cs typeface="Arial"/>
+                <a:sym typeface="Arial"/>
+              </a:rPr>
+              <a:t> </a:t>
+            </a:r>
+            <a:r>
+              <a:rPr lang="en-US" sz="1800">
+                <a:solidFill>
+                  <a:srgbClr val="8E00C6"/>
+                </a:solidFill>
+                <a:latin typeface="Arial"/>
+                <a:ea typeface="Arial"/>
+                <a:cs typeface="Arial"/>
+                <a:sym typeface="Arial"/>
+              </a:rPr>
+              <a:t>VIPCustomer</a:t>
+            </a:r>
+            <a:r>
+              <a:rPr lang="en-US" sz="1800">
+                <a:solidFill>
+                  <a:srgbClr val="FF0000"/>
+                </a:solidFill>
+                <a:latin typeface="Arial"/>
+                <a:ea typeface="Arial"/>
+                <a:cs typeface="Arial"/>
+                <a:sym typeface="Arial"/>
+              </a:rPr>
+              <a:t>;</a:t>
+            </a:r>
+            <a:endParaRPr sz="1800">
+              <a:solidFill>
+                <a:srgbClr val="000000"/>
+              </a:solidFill>
+              <a:latin typeface="Arial"/>
+              <a:ea typeface="Arial"/>
+              <a:cs typeface="Arial"/>
+              <a:sym typeface="Arial"/>
+            </a:endParaRPr>
+          </a:p>
+        </p:txBody>
+      </p:sp>
+      <p:sp>
+        <p:nvSpPr>
+          <p:cNvPr id="224" name="Google Shape;224;p16"/>
+          <p:cNvSpPr txBox="1"/>
+          <p:nvPr/>
+        </p:nvSpPr>
+        <p:spPr>
+          <a:xfrm>
+            <a:off x="615749" y="5107760"/>
+            <a:ext cx="9236173" cy="646331"/>
+          </a:xfrm>
+          <a:prstGeom prst="rect">
+            <a:avLst/>
+          </a:prstGeom>
+          <a:noFill/>
+          <a:ln>
+            <a:noFill/>
+          </a:ln>
+        </p:spPr>
+        <p:txBody>
+          <a:bodyPr spcFirstLastPara="1" wrap="square" lIns="91425" tIns="45700" rIns="91425" bIns="45700" anchor="t" anchorCtr="0">
+            <a:spAutoFit/>
+          </a:bodyPr>
+          <a:lstStyle/>
+          <a:p>
+            <a:pPr marL="0" marR="0" lvl="0" indent="0" algn="l" rtl="0">
+              <a:spcBef>
+                <a:spcPts val="0"/>
+              </a:spcBef>
+              <a:spcAft>
+                <a:spcPts val="0"/>
+              </a:spcAft>
+              <a:buNone/>
+            </a:pPr>
+            <a:r>
+              <a:rPr lang="en-US" sz="1800" b="1">
+                <a:solidFill>
+                  <a:srgbClr val="0E0E0E"/>
+                </a:solidFill>
+                <a:latin typeface="Arial"/>
+                <a:ea typeface="Arial"/>
+                <a:cs typeface="Arial"/>
+                <a:sym typeface="Arial"/>
+              </a:rPr>
+              <a:t>Explanation</a:t>
+            </a:r>
+            <a:r>
+              <a:rPr lang="en-US" sz="1800">
+                <a:solidFill>
+                  <a:srgbClr val="0E0E0E"/>
+                </a:solidFill>
+                <a:latin typeface="Arial"/>
+                <a:ea typeface="Arial"/>
+                <a:cs typeface="Arial"/>
+                <a:sym typeface="Arial"/>
+              </a:rPr>
+              <a:t>: This query trims any extra spaces from FirstName and LastName, concatenates them into a full name, and converts the Email to lowercase.</a:t>
             </a:r>
             <a:endParaRPr/>
           </a:p>

</xml_diff>